<commit_message>
update the deployment view
Issue-ID: SO-675

Change-Id: If4b0d19779f3d4f20392c5e57236b6dfd35ea9b6
Signed-off-by: seshukm <seshu.kumar.m@huawei.com>
</commit_message>
<xml_diff>
--- a/docs/architecture/SO Internal Arc.pptx
+++ b/docs/architecture/SO Internal Arc.pptx
@@ -6,6 +6,7 @@
   </p:sldMasterIdLst>
   <p:sldIdLst>
     <p:sldId id="257" r:id="rId2"/>
+    <p:sldId id="258" r:id="rId3"/>
   </p:sldIdLst>
   <p:sldSz cx="12192000" cy="6858000"/>
   <p:notesSz cx="6858000" cy="9144000"/>
@@ -104,6 +105,11 @@
       </a:defRPr>
     </a:lvl9pPr>
   </p:defaultTextStyle>
+  <p:extLst>
+    <p:ext uri="{EFAFB233-063F-42B5-8137-9DF3F51BA10A}">
+      <p15:sldGuideLst xmlns:p15="http://schemas.microsoft.com/office/powerpoint/2012/main"/>
+    </p:ext>
+  </p:extLst>
 </p:presentation>
 </file>
 
@@ -6501,6 +6507,1354 @@
 </p:sld>
 </file>
 
+<file path=ppt/slides/slide2.xml><?xml version="1.0" encoding="utf-8"?>
+<p:sld xmlns:a="http://schemas.openxmlformats.org/drawingml/2006/main" xmlns:r="http://schemas.openxmlformats.org/officeDocument/2006/relationships" xmlns:p="http://schemas.openxmlformats.org/presentationml/2006/main">
+  <p:cSld>
+    <p:spTree>
+      <p:nvGrpSpPr>
+        <p:cNvPr id="1" name=""/>
+        <p:cNvGrpSpPr/>
+        <p:nvPr/>
+      </p:nvGrpSpPr>
+      <p:grpSpPr>
+        <a:xfrm>
+          <a:off x="0" y="0"/>
+          <a:ext cx="0" cy="0"/>
+          <a:chOff x="0" y="0"/>
+          <a:chExt cx="0" cy="0"/>
+        </a:xfrm>
+      </p:grpSpPr>
+      <p:sp>
+        <p:nvSpPr>
+          <p:cNvPr id="2" name="Title 1"/>
+          <p:cNvSpPr>
+            <a:spLocks noGrp="1"/>
+          </p:cNvSpPr>
+          <p:nvPr>
+            <p:ph type="title"/>
+          </p:nvPr>
+        </p:nvSpPr>
+        <p:spPr>
+          <a:xfrm>
+            <a:off x="533400" y="0"/>
+            <a:ext cx="10515600" cy="1325563"/>
+          </a:xfrm>
+        </p:spPr>
+        <p:txBody>
+          <a:bodyPr/>
+          <a:lstStyle/>
+          <a:p>
+            <a:r>
+              <a:rPr lang="en-US" altLang="zh-CN" dirty="0" smtClean="0"/>
+              <a:t>Deployment View</a:t>
+            </a:r>
+            <a:endParaRPr lang="zh-CN" altLang="en-US" dirty="0"/>
+          </a:p>
+        </p:txBody>
+      </p:sp>
+      <p:grpSp>
+        <p:nvGrpSpPr>
+          <p:cNvPr id="44" name="Group 43"/>
+          <p:cNvGrpSpPr/>
+          <p:nvPr/>
+        </p:nvGrpSpPr>
+        <p:grpSpPr>
+          <a:xfrm>
+            <a:off x="838200" y="1034256"/>
+            <a:ext cx="4953000" cy="5638800"/>
+            <a:chOff x="7239000" y="971550"/>
+            <a:chExt cx="4953000" cy="5638800"/>
+          </a:xfrm>
+        </p:grpSpPr>
+        <p:sp>
+          <p:nvSpPr>
+            <p:cNvPr id="5" name="Rectangle 4"/>
+            <p:cNvSpPr/>
+            <p:nvPr/>
+          </p:nvSpPr>
+          <p:spPr>
+            <a:xfrm>
+              <a:off x="7239000" y="971550"/>
+              <a:ext cx="4953000" cy="5638800"/>
+            </a:xfrm>
+            <a:prstGeom prst="rect">
+              <a:avLst/>
+            </a:prstGeom>
+            <a:ln>
+              <a:noFill/>
+            </a:ln>
+            <a:effectLst>
+              <a:glow rad="101600">
+                <a:schemeClr val="accent5">
+                  <a:satMod val="175000"/>
+                  <a:alpha val="40000"/>
+                </a:schemeClr>
+              </a:glow>
+              <a:outerShdw blurRad="107950" dist="12700" dir="5400000" algn="ctr">
+                <a:srgbClr val="000000"/>
+              </a:outerShdw>
+            </a:effectLst>
+            <a:scene3d>
+              <a:camera prst="orthographicFront">
+                <a:rot lat="0" lon="0" rev="0"/>
+              </a:camera>
+              <a:lightRig rig="soft" dir="t">
+                <a:rot lat="0" lon="0" rev="0"/>
+              </a:lightRig>
+            </a:scene3d>
+            <a:sp3d contourW="44450" prstMaterial="matte">
+              <a:bevelT w="63500" h="63500" prst="artDeco"/>
+              <a:contourClr>
+                <a:srgbClr val="FFFFFF"/>
+              </a:contourClr>
+            </a:sp3d>
+          </p:spPr>
+          <p:style>
+            <a:lnRef idx="2">
+              <a:schemeClr val="dk1"/>
+            </a:lnRef>
+            <a:fillRef idx="1">
+              <a:schemeClr val="lt1"/>
+            </a:fillRef>
+            <a:effectRef idx="0">
+              <a:schemeClr val="dk1"/>
+            </a:effectRef>
+            <a:fontRef idx="minor">
+              <a:schemeClr val="dk1"/>
+            </a:fontRef>
+          </p:style>
+          <p:txBody>
+            <a:bodyPr rtlCol="0" anchor="ctr"/>
+            <a:lstStyle/>
+            <a:p>
+              <a:pPr algn="ctr"/>
+              <a:endParaRPr lang="zh-CN" altLang="en-US" dirty="0"/>
+            </a:p>
+          </p:txBody>
+        </p:sp>
+        <p:sp>
+          <p:nvSpPr>
+            <p:cNvPr id="6" name="TextBox 5"/>
+            <p:cNvSpPr txBox="1"/>
+            <p:nvPr/>
+          </p:nvSpPr>
+          <p:spPr>
+            <a:xfrm>
+              <a:off x="7267575" y="1030287"/>
+              <a:ext cx="3581400" cy="400110"/>
+            </a:xfrm>
+            <a:prstGeom prst="rect">
+              <a:avLst/>
+            </a:prstGeom>
+            <a:noFill/>
+          </p:spPr>
+          <p:txBody>
+            <a:bodyPr wrap="square" rtlCol="0">
+              <a:spAutoFit/>
+            </a:bodyPr>
+            <a:lstStyle/>
+            <a:p>
+              <a:r>
+                <a:rPr lang="en-US" altLang="zh-CN" sz="2000" dirty="0" smtClean="0"/>
+                <a:t>Spring Boot Application</a:t>
+              </a:r>
+              <a:endParaRPr lang="zh-CN" altLang="en-US" sz="2000" dirty="0"/>
+            </a:p>
+          </p:txBody>
+        </p:sp>
+        <p:grpSp>
+          <p:nvGrpSpPr>
+            <p:cNvPr id="19" name="Group 18"/>
+            <p:cNvGrpSpPr/>
+            <p:nvPr/>
+          </p:nvGrpSpPr>
+          <p:grpSpPr>
+            <a:xfrm>
+              <a:off x="7477125" y="1679598"/>
+              <a:ext cx="1962150" cy="809625"/>
+              <a:chOff x="7267575" y="1679599"/>
+              <a:chExt cx="1962150" cy="809625"/>
+            </a:xfrm>
+          </p:grpSpPr>
+          <p:sp>
+            <p:nvSpPr>
+              <p:cNvPr id="7" name="Rounded Rectangle 6"/>
+              <p:cNvSpPr/>
+              <p:nvPr/>
+            </p:nvSpPr>
+            <p:spPr>
+              <a:xfrm>
+                <a:off x="7267575" y="1679599"/>
+                <a:ext cx="1962150" cy="809625"/>
+              </a:xfrm>
+              <a:prstGeom prst="roundRect">
+                <a:avLst/>
+              </a:prstGeom>
+              <a:scene3d>
+                <a:camera prst="orthographicFront"/>
+                <a:lightRig rig="threePt" dir="t"/>
+              </a:scene3d>
+              <a:sp3d>
+                <a:bevelT w="165100" prst="coolSlant"/>
+              </a:sp3d>
+            </p:spPr>
+            <p:style>
+              <a:lnRef idx="2">
+                <a:schemeClr val="accent3">
+                  <a:shade val="50000"/>
+                </a:schemeClr>
+              </a:lnRef>
+              <a:fillRef idx="1">
+                <a:schemeClr val="accent3"/>
+              </a:fillRef>
+              <a:effectRef idx="0">
+                <a:schemeClr val="accent3"/>
+              </a:effectRef>
+              <a:fontRef idx="minor">
+                <a:schemeClr val="lt1"/>
+              </a:fontRef>
+            </p:style>
+            <p:txBody>
+              <a:bodyPr rtlCol="0" anchor="ctr"/>
+              <a:lstStyle/>
+              <a:p>
+                <a:pPr algn="ctr"/>
+                <a:endParaRPr lang="zh-CN" altLang="en-US"/>
+              </a:p>
+            </p:txBody>
+          </p:sp>
+          <p:sp>
+            <p:nvSpPr>
+              <p:cNvPr id="17" name="Rounded Rectangle 16"/>
+              <p:cNvSpPr/>
+              <p:nvPr/>
+            </p:nvSpPr>
+            <p:spPr>
+              <a:xfrm>
+                <a:off x="7439025" y="1847851"/>
+                <a:ext cx="1609725" cy="476250"/>
+              </a:xfrm>
+              <a:prstGeom prst="roundRect">
+                <a:avLst/>
+              </a:prstGeom>
+              <a:ln>
+                <a:noFill/>
+              </a:ln>
+              <a:effectLst>
+                <a:outerShdw blurRad="57785" dist="33020" dir="3180000" algn="ctr">
+                  <a:srgbClr val="000000">
+                    <a:alpha val="30000"/>
+                  </a:srgbClr>
+                </a:outerShdw>
+              </a:effectLst>
+              <a:scene3d>
+                <a:camera prst="orthographicFront">
+                  <a:rot lat="0" lon="0" rev="0"/>
+                </a:camera>
+                <a:lightRig rig="brightRoom" dir="t">
+                  <a:rot lat="0" lon="0" rev="600000"/>
+                </a:lightRig>
+              </a:scene3d>
+              <a:sp3d prstMaterial="metal">
+                <a:bevelT w="38100" h="57150" prst="angle"/>
+              </a:sp3d>
+            </p:spPr>
+            <p:style>
+              <a:lnRef idx="2">
+                <a:schemeClr val="accent1">
+                  <a:shade val="50000"/>
+                </a:schemeClr>
+              </a:lnRef>
+              <a:fillRef idx="1">
+                <a:schemeClr val="accent1"/>
+              </a:fillRef>
+              <a:effectRef idx="0">
+                <a:schemeClr val="accent1"/>
+              </a:effectRef>
+              <a:fontRef idx="minor">
+                <a:schemeClr val="lt1"/>
+              </a:fontRef>
+            </p:style>
+            <p:txBody>
+              <a:bodyPr rtlCol="0" anchor="ctr"/>
+              <a:lstStyle/>
+              <a:p>
+                <a:pPr algn="ctr"/>
+                <a:r>
+                  <a:rPr lang="en-US" altLang="zh-CN" sz="1100" dirty="0"/>
+                  <a:t>BPMN</a:t>
+                </a:r>
+                <a:r>
+                  <a:rPr lang="en-US" altLang="zh-CN" sz="1600" dirty="0" smtClean="0"/>
+                  <a:t> </a:t>
+                </a:r>
+                <a:r>
+                  <a:rPr lang="en-US" altLang="zh-CN" sz="1100" dirty="0"/>
+                  <a:t>Infra Jar</a:t>
+                </a:r>
+                <a:endParaRPr lang="zh-CN" altLang="en-US" sz="1100" dirty="0"/>
+              </a:p>
+            </p:txBody>
+          </p:sp>
+        </p:grpSp>
+        <p:grpSp>
+          <p:nvGrpSpPr>
+            <p:cNvPr id="20" name="Group 19"/>
+            <p:cNvGrpSpPr/>
+            <p:nvPr/>
+          </p:nvGrpSpPr>
+          <p:grpSpPr>
+            <a:xfrm>
+              <a:off x="9782175" y="1679599"/>
+              <a:ext cx="1962150" cy="809625"/>
+              <a:chOff x="7267575" y="1679599"/>
+              <a:chExt cx="1962150" cy="809625"/>
+            </a:xfrm>
+          </p:grpSpPr>
+          <p:sp>
+            <p:nvSpPr>
+              <p:cNvPr id="21" name="Rounded Rectangle 20"/>
+              <p:cNvSpPr/>
+              <p:nvPr/>
+            </p:nvSpPr>
+            <p:spPr>
+              <a:xfrm>
+                <a:off x="7267575" y="1679599"/>
+                <a:ext cx="1962150" cy="809625"/>
+              </a:xfrm>
+              <a:prstGeom prst="roundRect">
+                <a:avLst/>
+              </a:prstGeom>
+              <a:scene3d>
+                <a:camera prst="orthographicFront"/>
+                <a:lightRig rig="threePt" dir="t"/>
+              </a:scene3d>
+              <a:sp3d>
+                <a:bevelT w="165100" prst="coolSlant"/>
+              </a:sp3d>
+            </p:spPr>
+            <p:style>
+              <a:lnRef idx="2">
+                <a:schemeClr val="accent3">
+                  <a:shade val="50000"/>
+                </a:schemeClr>
+              </a:lnRef>
+              <a:fillRef idx="1">
+                <a:schemeClr val="accent3"/>
+              </a:fillRef>
+              <a:effectRef idx="0">
+                <a:schemeClr val="accent3"/>
+              </a:effectRef>
+              <a:fontRef idx="minor">
+                <a:schemeClr val="lt1"/>
+              </a:fontRef>
+            </p:style>
+            <p:txBody>
+              <a:bodyPr rtlCol="0" anchor="ctr"/>
+              <a:lstStyle/>
+              <a:p>
+                <a:pPr algn="ctr"/>
+                <a:endParaRPr lang="zh-CN" altLang="en-US"/>
+              </a:p>
+            </p:txBody>
+          </p:sp>
+          <p:sp>
+            <p:nvSpPr>
+              <p:cNvPr id="22" name="Rounded Rectangle 21"/>
+              <p:cNvSpPr/>
+              <p:nvPr/>
+            </p:nvSpPr>
+            <p:spPr>
+              <a:xfrm>
+                <a:off x="7439025" y="1847851"/>
+                <a:ext cx="1609725" cy="476250"/>
+              </a:xfrm>
+              <a:prstGeom prst="roundRect">
+                <a:avLst/>
+              </a:prstGeom>
+              <a:ln>
+                <a:noFill/>
+              </a:ln>
+              <a:effectLst>
+                <a:outerShdw blurRad="57785" dist="33020" dir="3180000" algn="ctr">
+                  <a:srgbClr val="000000">
+                    <a:alpha val="30000"/>
+                  </a:srgbClr>
+                </a:outerShdw>
+              </a:effectLst>
+              <a:scene3d>
+                <a:camera prst="orthographicFront">
+                  <a:rot lat="0" lon="0" rev="0"/>
+                </a:camera>
+                <a:lightRig rig="brightRoom" dir="t">
+                  <a:rot lat="0" lon="0" rev="600000"/>
+                </a:lightRig>
+              </a:scene3d>
+              <a:sp3d prstMaterial="metal">
+                <a:bevelT w="38100" h="57150" prst="angle"/>
+              </a:sp3d>
+            </p:spPr>
+            <p:style>
+              <a:lnRef idx="2">
+                <a:schemeClr val="accent1">
+                  <a:shade val="50000"/>
+                </a:schemeClr>
+              </a:lnRef>
+              <a:fillRef idx="1">
+                <a:schemeClr val="accent1"/>
+              </a:fillRef>
+              <a:effectRef idx="0">
+                <a:schemeClr val="accent1"/>
+              </a:effectRef>
+              <a:fontRef idx="minor">
+                <a:schemeClr val="lt1"/>
+              </a:fontRef>
+            </p:style>
+            <p:txBody>
+              <a:bodyPr rtlCol="0" anchor="ctr"/>
+              <a:lstStyle/>
+              <a:p>
+                <a:pPr algn="ctr"/>
+                <a:r>
+                  <a:rPr lang="en-US" altLang="zh-CN" sz="1100" dirty="0" smtClean="0"/>
+                  <a:t>Request DB Adapter Jar</a:t>
+                </a:r>
+                <a:endParaRPr lang="zh-CN" altLang="en-US" sz="1100" dirty="0"/>
+              </a:p>
+            </p:txBody>
+          </p:sp>
+        </p:grpSp>
+        <p:grpSp>
+          <p:nvGrpSpPr>
+            <p:cNvPr id="23" name="Group 22"/>
+            <p:cNvGrpSpPr/>
+            <p:nvPr/>
+          </p:nvGrpSpPr>
+          <p:grpSpPr>
+            <a:xfrm>
+              <a:off x="7529513" y="2698707"/>
+              <a:ext cx="1962150" cy="809625"/>
+              <a:chOff x="7267575" y="1679599"/>
+              <a:chExt cx="1962150" cy="809625"/>
+            </a:xfrm>
+          </p:grpSpPr>
+          <p:sp>
+            <p:nvSpPr>
+              <p:cNvPr id="24" name="Rounded Rectangle 23"/>
+              <p:cNvSpPr/>
+              <p:nvPr/>
+            </p:nvSpPr>
+            <p:spPr>
+              <a:xfrm>
+                <a:off x="7267575" y="1679599"/>
+                <a:ext cx="1962150" cy="809625"/>
+              </a:xfrm>
+              <a:prstGeom prst="roundRect">
+                <a:avLst/>
+              </a:prstGeom>
+              <a:scene3d>
+                <a:camera prst="orthographicFront"/>
+                <a:lightRig rig="threePt" dir="t"/>
+              </a:scene3d>
+              <a:sp3d>
+                <a:bevelT w="165100" prst="coolSlant"/>
+              </a:sp3d>
+            </p:spPr>
+            <p:style>
+              <a:lnRef idx="2">
+                <a:schemeClr val="accent3">
+                  <a:shade val="50000"/>
+                </a:schemeClr>
+              </a:lnRef>
+              <a:fillRef idx="1">
+                <a:schemeClr val="accent3"/>
+              </a:fillRef>
+              <a:effectRef idx="0">
+                <a:schemeClr val="accent3"/>
+              </a:effectRef>
+              <a:fontRef idx="minor">
+                <a:schemeClr val="lt1"/>
+              </a:fontRef>
+            </p:style>
+            <p:txBody>
+              <a:bodyPr rtlCol="0" anchor="ctr"/>
+              <a:lstStyle/>
+              <a:p>
+                <a:pPr algn="ctr"/>
+                <a:endParaRPr lang="zh-CN" altLang="en-US"/>
+              </a:p>
+            </p:txBody>
+          </p:sp>
+          <p:sp>
+            <p:nvSpPr>
+              <p:cNvPr id="25" name="Rounded Rectangle 24"/>
+              <p:cNvSpPr/>
+              <p:nvPr/>
+            </p:nvSpPr>
+            <p:spPr>
+              <a:xfrm>
+                <a:off x="7439025" y="1847851"/>
+                <a:ext cx="1609725" cy="476250"/>
+              </a:xfrm>
+              <a:prstGeom prst="roundRect">
+                <a:avLst/>
+              </a:prstGeom>
+              <a:ln>
+                <a:noFill/>
+              </a:ln>
+              <a:effectLst>
+                <a:outerShdw blurRad="57785" dist="33020" dir="3180000" algn="ctr">
+                  <a:srgbClr val="000000">
+                    <a:alpha val="30000"/>
+                  </a:srgbClr>
+                </a:outerShdw>
+              </a:effectLst>
+              <a:scene3d>
+                <a:camera prst="orthographicFront">
+                  <a:rot lat="0" lon="0" rev="0"/>
+                </a:camera>
+                <a:lightRig rig="brightRoom" dir="t">
+                  <a:rot lat="0" lon="0" rev="600000"/>
+                </a:lightRig>
+              </a:scene3d>
+              <a:sp3d prstMaterial="metal">
+                <a:bevelT w="38100" h="57150" prst="angle"/>
+              </a:sp3d>
+            </p:spPr>
+            <p:style>
+              <a:lnRef idx="2">
+                <a:schemeClr val="accent1">
+                  <a:shade val="50000"/>
+                </a:schemeClr>
+              </a:lnRef>
+              <a:fillRef idx="1">
+                <a:schemeClr val="accent1"/>
+              </a:fillRef>
+              <a:effectRef idx="0">
+                <a:schemeClr val="accent1"/>
+              </a:effectRef>
+              <a:fontRef idx="minor">
+                <a:schemeClr val="lt1"/>
+              </a:fontRef>
+            </p:style>
+            <p:txBody>
+              <a:bodyPr rtlCol="0" anchor="ctr"/>
+              <a:lstStyle/>
+              <a:p>
+                <a:pPr algn="ctr"/>
+                <a:r>
+                  <a:rPr lang="en-US" altLang="zh-CN" sz="1100" dirty="0"/>
+                  <a:t>SDNC Adapter Jar</a:t>
+                </a:r>
+                <a:endParaRPr lang="zh-CN" altLang="en-US" sz="1100" dirty="0"/>
+              </a:p>
+            </p:txBody>
+          </p:sp>
+        </p:grpSp>
+        <p:grpSp>
+          <p:nvGrpSpPr>
+            <p:cNvPr id="26" name="Group 25"/>
+            <p:cNvGrpSpPr/>
+            <p:nvPr/>
+          </p:nvGrpSpPr>
+          <p:grpSpPr>
+            <a:xfrm>
+              <a:off x="9782175" y="2698707"/>
+              <a:ext cx="1962150" cy="809625"/>
+              <a:chOff x="7267575" y="1679599"/>
+              <a:chExt cx="1962150" cy="809625"/>
+            </a:xfrm>
+          </p:grpSpPr>
+          <p:sp>
+            <p:nvSpPr>
+              <p:cNvPr id="27" name="Rounded Rectangle 26"/>
+              <p:cNvSpPr/>
+              <p:nvPr/>
+            </p:nvSpPr>
+            <p:spPr>
+              <a:xfrm>
+                <a:off x="7267575" y="1679599"/>
+                <a:ext cx="1962150" cy="809625"/>
+              </a:xfrm>
+              <a:prstGeom prst="roundRect">
+                <a:avLst/>
+              </a:prstGeom>
+              <a:scene3d>
+                <a:camera prst="orthographicFront"/>
+                <a:lightRig rig="threePt" dir="t"/>
+              </a:scene3d>
+              <a:sp3d>
+                <a:bevelT w="165100" prst="coolSlant"/>
+              </a:sp3d>
+            </p:spPr>
+            <p:style>
+              <a:lnRef idx="2">
+                <a:schemeClr val="accent3">
+                  <a:shade val="50000"/>
+                </a:schemeClr>
+              </a:lnRef>
+              <a:fillRef idx="1">
+                <a:schemeClr val="accent3"/>
+              </a:fillRef>
+              <a:effectRef idx="0">
+                <a:schemeClr val="accent3"/>
+              </a:effectRef>
+              <a:fontRef idx="minor">
+                <a:schemeClr val="lt1"/>
+              </a:fontRef>
+            </p:style>
+            <p:txBody>
+              <a:bodyPr rtlCol="0" anchor="ctr"/>
+              <a:lstStyle/>
+              <a:p>
+                <a:pPr algn="ctr"/>
+                <a:endParaRPr lang="zh-CN" altLang="en-US"/>
+              </a:p>
+            </p:txBody>
+          </p:sp>
+          <p:sp>
+            <p:nvSpPr>
+              <p:cNvPr id="28" name="Rounded Rectangle 27"/>
+              <p:cNvSpPr/>
+              <p:nvPr/>
+            </p:nvSpPr>
+            <p:spPr>
+              <a:xfrm>
+                <a:off x="7439025" y="1847851"/>
+                <a:ext cx="1609725" cy="476250"/>
+              </a:xfrm>
+              <a:prstGeom prst="roundRect">
+                <a:avLst/>
+              </a:prstGeom>
+              <a:ln>
+                <a:noFill/>
+              </a:ln>
+              <a:effectLst>
+                <a:outerShdw blurRad="57785" dist="33020" dir="3180000" algn="ctr">
+                  <a:srgbClr val="000000">
+                    <a:alpha val="30000"/>
+                  </a:srgbClr>
+                </a:outerShdw>
+              </a:effectLst>
+              <a:scene3d>
+                <a:camera prst="orthographicFront">
+                  <a:rot lat="0" lon="0" rev="0"/>
+                </a:camera>
+                <a:lightRig rig="brightRoom" dir="t">
+                  <a:rot lat="0" lon="0" rev="600000"/>
+                </a:lightRig>
+              </a:scene3d>
+              <a:sp3d prstMaterial="metal">
+                <a:bevelT w="38100" h="57150" prst="angle"/>
+              </a:sp3d>
+            </p:spPr>
+            <p:style>
+              <a:lnRef idx="2">
+                <a:schemeClr val="accent1">
+                  <a:shade val="50000"/>
+                </a:schemeClr>
+              </a:lnRef>
+              <a:fillRef idx="1">
+                <a:schemeClr val="accent1"/>
+              </a:fillRef>
+              <a:effectRef idx="0">
+                <a:schemeClr val="accent1"/>
+              </a:effectRef>
+              <a:fontRef idx="minor">
+                <a:schemeClr val="lt1"/>
+              </a:fontRef>
+            </p:style>
+            <p:txBody>
+              <a:bodyPr rtlCol="0" anchor="ctr"/>
+              <a:lstStyle/>
+              <a:p>
+                <a:pPr algn="ctr"/>
+                <a:r>
+                  <a:rPr lang="en-US" altLang="zh-CN" sz="1100" dirty="0" smtClean="0"/>
+                  <a:t>Cloud Adapter </a:t>
+                </a:r>
+                <a:r>
+                  <a:rPr lang="en-US" altLang="zh-CN" sz="1100" dirty="0"/>
+                  <a:t>Jar</a:t>
+                </a:r>
+                <a:endParaRPr lang="zh-CN" altLang="en-US" sz="1100" dirty="0"/>
+              </a:p>
+            </p:txBody>
+          </p:sp>
+        </p:grpSp>
+        <p:grpSp>
+          <p:nvGrpSpPr>
+            <p:cNvPr id="29" name="Group 28"/>
+            <p:cNvGrpSpPr/>
+            <p:nvPr/>
+          </p:nvGrpSpPr>
+          <p:grpSpPr>
+            <a:xfrm>
+              <a:off x="7519987" y="3678201"/>
+              <a:ext cx="1962150" cy="809625"/>
+              <a:chOff x="7267575" y="1679599"/>
+              <a:chExt cx="1962150" cy="809625"/>
+            </a:xfrm>
+          </p:grpSpPr>
+          <p:sp>
+            <p:nvSpPr>
+              <p:cNvPr id="30" name="Rounded Rectangle 29"/>
+              <p:cNvSpPr/>
+              <p:nvPr/>
+            </p:nvSpPr>
+            <p:spPr>
+              <a:xfrm>
+                <a:off x="7267575" y="1679599"/>
+                <a:ext cx="1962150" cy="809625"/>
+              </a:xfrm>
+              <a:prstGeom prst="roundRect">
+                <a:avLst/>
+              </a:prstGeom>
+              <a:scene3d>
+                <a:camera prst="orthographicFront"/>
+                <a:lightRig rig="threePt" dir="t"/>
+              </a:scene3d>
+              <a:sp3d>
+                <a:bevelT w="165100" prst="coolSlant"/>
+              </a:sp3d>
+            </p:spPr>
+            <p:style>
+              <a:lnRef idx="2">
+                <a:schemeClr val="accent3">
+                  <a:shade val="50000"/>
+                </a:schemeClr>
+              </a:lnRef>
+              <a:fillRef idx="1">
+                <a:schemeClr val="accent3"/>
+              </a:fillRef>
+              <a:effectRef idx="0">
+                <a:schemeClr val="accent3"/>
+              </a:effectRef>
+              <a:fontRef idx="minor">
+                <a:schemeClr val="lt1"/>
+              </a:fontRef>
+            </p:style>
+            <p:txBody>
+              <a:bodyPr rtlCol="0" anchor="ctr"/>
+              <a:lstStyle/>
+              <a:p>
+                <a:pPr algn="ctr"/>
+                <a:endParaRPr lang="zh-CN" altLang="en-US"/>
+              </a:p>
+            </p:txBody>
+          </p:sp>
+          <p:sp>
+            <p:nvSpPr>
+              <p:cNvPr id="31" name="Rounded Rectangle 30"/>
+              <p:cNvSpPr/>
+              <p:nvPr/>
+            </p:nvSpPr>
+            <p:spPr>
+              <a:xfrm>
+                <a:off x="7439025" y="1847851"/>
+                <a:ext cx="1609725" cy="476250"/>
+              </a:xfrm>
+              <a:prstGeom prst="roundRect">
+                <a:avLst/>
+              </a:prstGeom>
+              <a:ln>
+                <a:noFill/>
+              </a:ln>
+              <a:effectLst>
+                <a:outerShdw blurRad="57785" dist="33020" dir="3180000" algn="ctr">
+                  <a:srgbClr val="000000">
+                    <a:alpha val="30000"/>
+                  </a:srgbClr>
+                </a:outerShdw>
+              </a:effectLst>
+              <a:scene3d>
+                <a:camera prst="orthographicFront">
+                  <a:rot lat="0" lon="0" rev="0"/>
+                </a:camera>
+                <a:lightRig rig="brightRoom" dir="t">
+                  <a:rot lat="0" lon="0" rev="600000"/>
+                </a:lightRig>
+              </a:scene3d>
+              <a:sp3d prstMaterial="metal">
+                <a:bevelT w="38100" h="57150" prst="angle"/>
+              </a:sp3d>
+            </p:spPr>
+            <p:style>
+              <a:lnRef idx="2">
+                <a:schemeClr val="accent1">
+                  <a:shade val="50000"/>
+                </a:schemeClr>
+              </a:lnRef>
+              <a:fillRef idx="1">
+                <a:schemeClr val="accent1"/>
+              </a:fillRef>
+              <a:effectRef idx="0">
+                <a:schemeClr val="accent1"/>
+              </a:effectRef>
+              <a:fontRef idx="minor">
+                <a:schemeClr val="lt1"/>
+              </a:fontRef>
+            </p:style>
+            <p:txBody>
+              <a:bodyPr rtlCol="0" anchor="ctr"/>
+              <a:lstStyle/>
+              <a:p>
+                <a:pPr algn="ctr"/>
+                <a:r>
+                  <a:rPr lang="en-US" altLang="zh-CN" sz="1100" dirty="0" smtClean="0"/>
+                  <a:t>API Handler Jar</a:t>
+                </a:r>
+                <a:endParaRPr lang="zh-CN" altLang="en-US" sz="1100" dirty="0"/>
+              </a:p>
+            </p:txBody>
+          </p:sp>
+        </p:grpSp>
+        <p:grpSp>
+          <p:nvGrpSpPr>
+            <p:cNvPr id="32" name="Group 31"/>
+            <p:cNvGrpSpPr/>
+            <p:nvPr/>
+          </p:nvGrpSpPr>
+          <p:grpSpPr>
+            <a:xfrm>
+              <a:off x="9782175" y="3678201"/>
+              <a:ext cx="1962150" cy="809625"/>
+              <a:chOff x="7267575" y="1679599"/>
+              <a:chExt cx="1962150" cy="809625"/>
+            </a:xfrm>
+          </p:grpSpPr>
+          <p:sp>
+            <p:nvSpPr>
+              <p:cNvPr id="33" name="Rounded Rectangle 32"/>
+              <p:cNvSpPr/>
+              <p:nvPr/>
+            </p:nvSpPr>
+            <p:spPr>
+              <a:xfrm>
+                <a:off x="7267575" y="1679599"/>
+                <a:ext cx="1962150" cy="809625"/>
+              </a:xfrm>
+              <a:prstGeom prst="roundRect">
+                <a:avLst/>
+              </a:prstGeom>
+              <a:scene3d>
+                <a:camera prst="orthographicFront"/>
+                <a:lightRig rig="threePt" dir="t"/>
+              </a:scene3d>
+              <a:sp3d>
+                <a:bevelT w="165100" prst="coolSlant"/>
+              </a:sp3d>
+            </p:spPr>
+            <p:style>
+              <a:lnRef idx="2">
+                <a:schemeClr val="accent3">
+                  <a:shade val="50000"/>
+                </a:schemeClr>
+              </a:lnRef>
+              <a:fillRef idx="1">
+                <a:schemeClr val="accent3"/>
+              </a:fillRef>
+              <a:effectRef idx="0">
+                <a:schemeClr val="accent3"/>
+              </a:effectRef>
+              <a:fontRef idx="minor">
+                <a:schemeClr val="lt1"/>
+              </a:fontRef>
+            </p:style>
+            <p:txBody>
+              <a:bodyPr rtlCol="0" anchor="ctr"/>
+              <a:lstStyle/>
+              <a:p>
+                <a:pPr algn="ctr"/>
+                <a:endParaRPr lang="zh-CN" altLang="en-US"/>
+              </a:p>
+            </p:txBody>
+          </p:sp>
+          <p:sp>
+            <p:nvSpPr>
+              <p:cNvPr id="34" name="Rounded Rectangle 33"/>
+              <p:cNvSpPr/>
+              <p:nvPr/>
+            </p:nvSpPr>
+            <p:spPr>
+              <a:xfrm>
+                <a:off x="7439025" y="1847851"/>
+                <a:ext cx="1609725" cy="476250"/>
+              </a:xfrm>
+              <a:prstGeom prst="roundRect">
+                <a:avLst/>
+              </a:prstGeom>
+              <a:ln>
+                <a:noFill/>
+              </a:ln>
+              <a:effectLst>
+                <a:outerShdw blurRad="57785" dist="33020" dir="3180000" algn="ctr">
+                  <a:srgbClr val="000000">
+                    <a:alpha val="30000"/>
+                  </a:srgbClr>
+                </a:outerShdw>
+              </a:effectLst>
+              <a:scene3d>
+                <a:camera prst="orthographicFront">
+                  <a:rot lat="0" lon="0" rev="0"/>
+                </a:camera>
+                <a:lightRig rig="brightRoom" dir="t">
+                  <a:rot lat="0" lon="0" rev="600000"/>
+                </a:lightRig>
+              </a:scene3d>
+              <a:sp3d prstMaterial="metal">
+                <a:bevelT w="38100" h="57150" prst="angle"/>
+              </a:sp3d>
+            </p:spPr>
+            <p:style>
+              <a:lnRef idx="2">
+                <a:schemeClr val="accent1">
+                  <a:shade val="50000"/>
+                </a:schemeClr>
+              </a:lnRef>
+              <a:fillRef idx="1">
+                <a:schemeClr val="accent1"/>
+              </a:fillRef>
+              <a:effectRef idx="0">
+                <a:schemeClr val="accent1"/>
+              </a:effectRef>
+              <a:fontRef idx="minor">
+                <a:schemeClr val="lt1"/>
+              </a:fontRef>
+            </p:style>
+            <p:txBody>
+              <a:bodyPr rtlCol="0" anchor="ctr"/>
+              <a:lstStyle/>
+              <a:p>
+                <a:pPr algn="ctr"/>
+                <a:r>
+                  <a:rPr lang="en-US" altLang="zh-CN" sz="1100" dirty="0" smtClean="0"/>
+                  <a:t>SDC Controller Jar</a:t>
+                </a:r>
+                <a:endParaRPr lang="zh-CN" altLang="en-US" sz="1100" dirty="0"/>
+              </a:p>
+            </p:txBody>
+          </p:sp>
+        </p:grpSp>
+        <p:grpSp>
+          <p:nvGrpSpPr>
+            <p:cNvPr id="35" name="Group 34"/>
+            <p:cNvGrpSpPr/>
+            <p:nvPr/>
+          </p:nvGrpSpPr>
+          <p:grpSpPr>
+            <a:xfrm>
+              <a:off x="7519987" y="4656078"/>
+              <a:ext cx="1962150" cy="809625"/>
+              <a:chOff x="7267575" y="1679599"/>
+              <a:chExt cx="1962150" cy="809625"/>
+            </a:xfrm>
+          </p:grpSpPr>
+          <p:sp>
+            <p:nvSpPr>
+              <p:cNvPr id="36" name="Rounded Rectangle 35"/>
+              <p:cNvSpPr/>
+              <p:nvPr/>
+            </p:nvSpPr>
+            <p:spPr>
+              <a:xfrm>
+                <a:off x="7267575" y="1679599"/>
+                <a:ext cx="1962150" cy="809625"/>
+              </a:xfrm>
+              <a:prstGeom prst="roundRect">
+                <a:avLst/>
+              </a:prstGeom>
+              <a:scene3d>
+                <a:camera prst="orthographicFront"/>
+                <a:lightRig rig="threePt" dir="t"/>
+              </a:scene3d>
+              <a:sp3d>
+                <a:bevelT w="165100" prst="coolSlant"/>
+              </a:sp3d>
+            </p:spPr>
+            <p:style>
+              <a:lnRef idx="2">
+                <a:schemeClr val="accent3">
+                  <a:shade val="50000"/>
+                </a:schemeClr>
+              </a:lnRef>
+              <a:fillRef idx="1">
+                <a:schemeClr val="accent3"/>
+              </a:fillRef>
+              <a:effectRef idx="0">
+                <a:schemeClr val="accent3"/>
+              </a:effectRef>
+              <a:fontRef idx="minor">
+                <a:schemeClr val="lt1"/>
+              </a:fontRef>
+            </p:style>
+            <p:txBody>
+              <a:bodyPr rtlCol="0" anchor="ctr"/>
+              <a:lstStyle/>
+              <a:p>
+                <a:pPr algn="ctr"/>
+                <a:endParaRPr lang="zh-CN" altLang="en-US"/>
+              </a:p>
+            </p:txBody>
+          </p:sp>
+          <p:sp>
+            <p:nvSpPr>
+              <p:cNvPr id="37" name="Rounded Rectangle 36"/>
+              <p:cNvSpPr/>
+              <p:nvPr/>
+            </p:nvSpPr>
+            <p:spPr>
+              <a:xfrm>
+                <a:off x="7439025" y="1847851"/>
+                <a:ext cx="1609725" cy="476250"/>
+              </a:xfrm>
+              <a:prstGeom prst="roundRect">
+                <a:avLst/>
+              </a:prstGeom>
+              <a:ln>
+                <a:noFill/>
+              </a:ln>
+              <a:effectLst>
+                <a:outerShdw blurRad="57785" dist="33020" dir="3180000" algn="ctr">
+                  <a:srgbClr val="000000">
+                    <a:alpha val="30000"/>
+                  </a:srgbClr>
+                </a:outerShdw>
+              </a:effectLst>
+              <a:scene3d>
+                <a:camera prst="orthographicFront">
+                  <a:rot lat="0" lon="0" rev="0"/>
+                </a:camera>
+                <a:lightRig rig="brightRoom" dir="t">
+                  <a:rot lat="0" lon="0" rev="600000"/>
+                </a:lightRig>
+              </a:scene3d>
+              <a:sp3d prstMaterial="metal">
+                <a:bevelT w="38100" h="57150" prst="angle"/>
+              </a:sp3d>
+            </p:spPr>
+            <p:style>
+              <a:lnRef idx="2">
+                <a:schemeClr val="accent1">
+                  <a:shade val="50000"/>
+                </a:schemeClr>
+              </a:lnRef>
+              <a:fillRef idx="1">
+                <a:schemeClr val="accent1"/>
+              </a:fillRef>
+              <a:effectRef idx="0">
+                <a:schemeClr val="accent1"/>
+              </a:effectRef>
+              <a:fontRef idx="minor">
+                <a:schemeClr val="lt1"/>
+              </a:fontRef>
+            </p:style>
+            <p:txBody>
+              <a:bodyPr rtlCol="0" anchor="ctr"/>
+              <a:lstStyle/>
+              <a:p>
+                <a:pPr algn="ctr"/>
+                <a:r>
+                  <a:rPr lang="en-US" altLang="zh-CN" sz="1100" dirty="0" smtClean="0"/>
+                  <a:t>Catalog Adapter Jar</a:t>
+                </a:r>
+                <a:endParaRPr lang="zh-CN" altLang="en-US" sz="1100" dirty="0"/>
+              </a:p>
+            </p:txBody>
+          </p:sp>
+        </p:grpSp>
+        <p:grpSp>
+          <p:nvGrpSpPr>
+            <p:cNvPr id="38" name="Group 37"/>
+            <p:cNvGrpSpPr/>
+            <p:nvPr/>
+          </p:nvGrpSpPr>
+          <p:grpSpPr>
+            <a:xfrm>
+              <a:off x="9782175" y="4684610"/>
+              <a:ext cx="1962150" cy="809625"/>
+              <a:chOff x="7267575" y="1679599"/>
+              <a:chExt cx="1962150" cy="809625"/>
+            </a:xfrm>
+          </p:grpSpPr>
+          <p:sp>
+            <p:nvSpPr>
+              <p:cNvPr id="39" name="Rounded Rectangle 38"/>
+              <p:cNvSpPr/>
+              <p:nvPr/>
+            </p:nvSpPr>
+            <p:spPr>
+              <a:xfrm>
+                <a:off x="7267575" y="1679599"/>
+                <a:ext cx="1962150" cy="809625"/>
+              </a:xfrm>
+              <a:prstGeom prst="roundRect">
+                <a:avLst/>
+              </a:prstGeom>
+              <a:scene3d>
+                <a:camera prst="orthographicFront"/>
+                <a:lightRig rig="threePt" dir="t"/>
+              </a:scene3d>
+              <a:sp3d>
+                <a:bevelT w="165100" prst="coolSlant"/>
+              </a:sp3d>
+            </p:spPr>
+            <p:style>
+              <a:lnRef idx="2">
+                <a:schemeClr val="accent3">
+                  <a:shade val="50000"/>
+                </a:schemeClr>
+              </a:lnRef>
+              <a:fillRef idx="1">
+                <a:schemeClr val="accent3"/>
+              </a:fillRef>
+              <a:effectRef idx="0">
+                <a:schemeClr val="accent3"/>
+              </a:effectRef>
+              <a:fontRef idx="minor">
+                <a:schemeClr val="lt1"/>
+              </a:fontRef>
+            </p:style>
+            <p:txBody>
+              <a:bodyPr rtlCol="0" anchor="ctr"/>
+              <a:lstStyle/>
+              <a:p>
+                <a:pPr algn="ctr"/>
+                <a:endParaRPr lang="zh-CN" altLang="en-US"/>
+              </a:p>
+            </p:txBody>
+          </p:sp>
+          <p:sp>
+            <p:nvSpPr>
+              <p:cNvPr id="40" name="Rounded Rectangle 39"/>
+              <p:cNvSpPr/>
+              <p:nvPr/>
+            </p:nvSpPr>
+            <p:spPr>
+              <a:xfrm>
+                <a:off x="7439025" y="1847851"/>
+                <a:ext cx="1609725" cy="476250"/>
+              </a:xfrm>
+              <a:prstGeom prst="roundRect">
+                <a:avLst/>
+              </a:prstGeom>
+              <a:ln>
+                <a:noFill/>
+              </a:ln>
+              <a:effectLst>
+                <a:outerShdw blurRad="57785" dist="33020" dir="3180000" algn="ctr">
+                  <a:srgbClr val="000000">
+                    <a:alpha val="30000"/>
+                  </a:srgbClr>
+                </a:outerShdw>
+              </a:effectLst>
+              <a:scene3d>
+                <a:camera prst="orthographicFront">
+                  <a:rot lat="0" lon="0" rev="0"/>
+                </a:camera>
+                <a:lightRig rig="brightRoom" dir="t">
+                  <a:rot lat="0" lon="0" rev="600000"/>
+                </a:lightRig>
+              </a:scene3d>
+              <a:sp3d prstMaterial="metal">
+                <a:bevelT w="38100" h="57150" prst="angle"/>
+              </a:sp3d>
+            </p:spPr>
+            <p:style>
+              <a:lnRef idx="2">
+                <a:schemeClr val="accent1">
+                  <a:shade val="50000"/>
+                </a:schemeClr>
+              </a:lnRef>
+              <a:fillRef idx="1">
+                <a:schemeClr val="accent1"/>
+              </a:fillRef>
+              <a:effectRef idx="0">
+                <a:schemeClr val="accent1"/>
+              </a:effectRef>
+              <a:fontRef idx="minor">
+                <a:schemeClr val="lt1"/>
+              </a:fontRef>
+            </p:style>
+            <p:txBody>
+              <a:bodyPr rtlCol="0" anchor="ctr"/>
+              <a:lstStyle/>
+              <a:p>
+                <a:pPr algn="ctr"/>
+                <a:r>
+                  <a:rPr lang="en-US" altLang="zh-CN" sz="1100" dirty="0" smtClean="0"/>
+                  <a:t>VFC Adapter Jar</a:t>
+                </a:r>
+                <a:endParaRPr lang="zh-CN" altLang="en-US" sz="1100" dirty="0"/>
+              </a:p>
+            </p:txBody>
+          </p:sp>
+        </p:grpSp>
+        <p:grpSp>
+          <p:nvGrpSpPr>
+            <p:cNvPr id="41" name="Group 40"/>
+            <p:cNvGrpSpPr/>
+            <p:nvPr/>
+          </p:nvGrpSpPr>
+          <p:grpSpPr>
+            <a:xfrm>
+              <a:off x="7519987" y="5633955"/>
+              <a:ext cx="1962150" cy="809625"/>
+              <a:chOff x="7267575" y="1679599"/>
+              <a:chExt cx="1962150" cy="809625"/>
+            </a:xfrm>
+          </p:grpSpPr>
+          <p:sp>
+            <p:nvSpPr>
+              <p:cNvPr id="42" name="Rounded Rectangle 41"/>
+              <p:cNvSpPr/>
+              <p:nvPr/>
+            </p:nvSpPr>
+            <p:spPr>
+              <a:xfrm>
+                <a:off x="7267575" y="1679599"/>
+                <a:ext cx="1962150" cy="809625"/>
+              </a:xfrm>
+              <a:prstGeom prst="roundRect">
+                <a:avLst/>
+              </a:prstGeom>
+              <a:scene3d>
+                <a:camera prst="orthographicFront"/>
+                <a:lightRig rig="threePt" dir="t"/>
+              </a:scene3d>
+              <a:sp3d>
+                <a:bevelT w="165100" prst="coolSlant"/>
+              </a:sp3d>
+            </p:spPr>
+            <p:style>
+              <a:lnRef idx="2">
+                <a:schemeClr val="accent3">
+                  <a:shade val="50000"/>
+                </a:schemeClr>
+              </a:lnRef>
+              <a:fillRef idx="1">
+                <a:schemeClr val="accent3"/>
+              </a:fillRef>
+              <a:effectRef idx="0">
+                <a:schemeClr val="accent3"/>
+              </a:effectRef>
+              <a:fontRef idx="minor">
+                <a:schemeClr val="lt1"/>
+              </a:fontRef>
+            </p:style>
+            <p:txBody>
+              <a:bodyPr rtlCol="0" anchor="ctr"/>
+              <a:lstStyle/>
+              <a:p>
+                <a:pPr algn="ctr"/>
+                <a:endParaRPr lang="zh-CN" altLang="en-US"/>
+              </a:p>
+            </p:txBody>
+          </p:sp>
+          <p:sp>
+            <p:nvSpPr>
+              <p:cNvPr id="43" name="Rounded Rectangle 42"/>
+              <p:cNvSpPr/>
+              <p:nvPr/>
+            </p:nvSpPr>
+            <p:spPr>
+              <a:xfrm>
+                <a:off x="7439025" y="1847851"/>
+                <a:ext cx="1609725" cy="476250"/>
+              </a:xfrm>
+              <a:prstGeom prst="roundRect">
+                <a:avLst/>
+              </a:prstGeom>
+              <a:ln>
+                <a:noFill/>
+              </a:ln>
+              <a:effectLst>
+                <a:outerShdw blurRad="57785" dist="33020" dir="3180000" algn="ctr">
+                  <a:srgbClr val="000000">
+                    <a:alpha val="30000"/>
+                  </a:srgbClr>
+                </a:outerShdw>
+              </a:effectLst>
+              <a:scene3d>
+                <a:camera prst="orthographicFront">
+                  <a:rot lat="0" lon="0" rev="0"/>
+                </a:camera>
+                <a:lightRig rig="brightRoom" dir="t">
+                  <a:rot lat="0" lon="0" rev="600000"/>
+                </a:lightRig>
+              </a:scene3d>
+              <a:sp3d prstMaterial="metal">
+                <a:bevelT w="38100" h="57150" prst="angle"/>
+              </a:sp3d>
+            </p:spPr>
+            <p:style>
+              <a:lnRef idx="2">
+                <a:schemeClr val="accent1">
+                  <a:shade val="50000"/>
+                </a:schemeClr>
+              </a:lnRef>
+              <a:fillRef idx="1">
+                <a:schemeClr val="accent1"/>
+              </a:fillRef>
+              <a:effectRef idx="0">
+                <a:schemeClr val="accent1"/>
+              </a:effectRef>
+              <a:fontRef idx="minor">
+                <a:schemeClr val="lt1"/>
+              </a:fontRef>
+            </p:style>
+            <p:txBody>
+              <a:bodyPr rtlCol="0" anchor="ctr"/>
+              <a:lstStyle/>
+              <a:p>
+                <a:pPr algn="ctr"/>
+                <a:r>
+                  <a:rPr lang="en-US" altLang="zh-CN" sz="1100" dirty="0" smtClean="0"/>
+                  <a:t>VNFM Adapter Jar</a:t>
+                </a:r>
+                <a:endParaRPr lang="zh-CN" altLang="en-US" sz="1100" dirty="0"/>
+              </a:p>
+            </p:txBody>
+          </p:sp>
+        </p:grpSp>
+      </p:grpSp>
+      <p:pic>
+        <p:nvPicPr>
+          <p:cNvPr id="45" name="Picture 44"/>
+          <p:cNvPicPr>
+            <a:picLocks noChangeAspect="1"/>
+          </p:cNvPicPr>
+          <p:nvPr/>
+        </p:nvPicPr>
+        <p:blipFill>
+          <a:blip r:embed="rId2"/>
+          <a:stretch>
+            <a:fillRect/>
+          </a:stretch>
+        </p:blipFill>
+        <p:spPr>
+          <a:xfrm>
+            <a:off x="6724553" y="4718784"/>
+            <a:ext cx="1390844" cy="1695687"/>
+          </a:xfrm>
+          <a:prstGeom prst="rect">
+            <a:avLst/>
+          </a:prstGeom>
+        </p:spPr>
+      </p:pic>
+    </p:spTree>
+    <p:extLst>
+      <p:ext uri="{BB962C8B-B14F-4D97-AF65-F5344CB8AC3E}">
+        <p14:creationId xmlns:p14="http://schemas.microsoft.com/office/powerpoint/2010/main" val="1087933119"/>
+      </p:ext>
+    </p:extLst>
+  </p:cSld>
+  <p:clrMapOvr>
+    <a:masterClrMapping/>
+  </p:clrMapOvr>
+</p:sld>
+</file>
+
 <file path=ppt/theme/theme1.xml><?xml version="1.0" encoding="utf-8"?>
 <a:theme xmlns:a="http://schemas.openxmlformats.org/drawingml/2006/main" name="Office Theme">
   <a:themeElements>

</xml_diff>

<commit_message>
update the interface flows in SO
Issue-ID: SO-675

Change-Id: Iea43b256422af69e6dcbbdb9282a125a6bfef0e8
Signed-off-by: seshukm <seshu.kumar.m@huawei.com>
</commit_message>
<xml_diff>
--- a/docs/architecture/SO Internal Arc.pptx
+++ b/docs/architecture/SO Internal Arc.pptx
@@ -7,6 +7,7 @@
   <p:sldIdLst>
     <p:sldId id="257" r:id="rId2"/>
     <p:sldId id="258" r:id="rId3"/>
+    <p:sldId id="259" r:id="rId4"/>
   </p:sldIdLst>
   <p:sldSz cx="12192000" cy="6858000"/>
   <p:notesSz cx="6858000" cy="9144000"/>
@@ -244,7 +245,7 @@
           <a:p>
             <a:fld id="{61E7D421-8CE4-4F19-BE4B-2C0A0F6FCEE0}" type="datetimeFigureOut">
               <a:rPr lang="zh-CN" altLang="en-US" smtClean="0"/>
-              <a:t>2019/4/16</a:t>
+              <a:t>2019/4/25</a:t>
             </a:fld>
             <a:endParaRPr lang="zh-CN" altLang="en-US"/>
           </a:p>
@@ -414,7 +415,7 @@
           <a:p>
             <a:fld id="{61E7D421-8CE4-4F19-BE4B-2C0A0F6FCEE0}" type="datetimeFigureOut">
               <a:rPr lang="zh-CN" altLang="en-US" smtClean="0"/>
-              <a:t>2019/4/16</a:t>
+              <a:t>2019/4/25</a:t>
             </a:fld>
             <a:endParaRPr lang="zh-CN" altLang="en-US"/>
           </a:p>
@@ -594,7 +595,7 @@
           <a:p>
             <a:fld id="{61E7D421-8CE4-4F19-BE4B-2C0A0F6FCEE0}" type="datetimeFigureOut">
               <a:rPr lang="zh-CN" altLang="en-US" smtClean="0"/>
-              <a:t>2019/4/16</a:t>
+              <a:t>2019/4/25</a:t>
             </a:fld>
             <a:endParaRPr lang="zh-CN" altLang="en-US"/>
           </a:p>
@@ -764,7 +765,7 @@
           <a:p>
             <a:fld id="{61E7D421-8CE4-4F19-BE4B-2C0A0F6FCEE0}" type="datetimeFigureOut">
               <a:rPr lang="zh-CN" altLang="en-US" smtClean="0"/>
-              <a:t>2019/4/16</a:t>
+              <a:t>2019/4/25</a:t>
             </a:fld>
             <a:endParaRPr lang="zh-CN" altLang="en-US"/>
           </a:p>
@@ -1010,7 +1011,7 @@
           <a:p>
             <a:fld id="{61E7D421-8CE4-4F19-BE4B-2C0A0F6FCEE0}" type="datetimeFigureOut">
               <a:rPr lang="zh-CN" altLang="en-US" smtClean="0"/>
-              <a:t>2019/4/16</a:t>
+              <a:t>2019/4/25</a:t>
             </a:fld>
             <a:endParaRPr lang="zh-CN" altLang="en-US"/>
           </a:p>
@@ -1242,7 +1243,7 @@
           <a:p>
             <a:fld id="{61E7D421-8CE4-4F19-BE4B-2C0A0F6FCEE0}" type="datetimeFigureOut">
               <a:rPr lang="zh-CN" altLang="en-US" smtClean="0"/>
-              <a:t>2019/4/16</a:t>
+              <a:t>2019/4/25</a:t>
             </a:fld>
             <a:endParaRPr lang="zh-CN" altLang="en-US"/>
           </a:p>
@@ -1609,7 +1610,7 @@
           <a:p>
             <a:fld id="{61E7D421-8CE4-4F19-BE4B-2C0A0F6FCEE0}" type="datetimeFigureOut">
               <a:rPr lang="zh-CN" altLang="en-US" smtClean="0"/>
-              <a:t>2019/4/16</a:t>
+              <a:t>2019/4/25</a:t>
             </a:fld>
             <a:endParaRPr lang="zh-CN" altLang="en-US"/>
           </a:p>
@@ -1727,7 +1728,7 @@
           <a:p>
             <a:fld id="{61E7D421-8CE4-4F19-BE4B-2C0A0F6FCEE0}" type="datetimeFigureOut">
               <a:rPr lang="zh-CN" altLang="en-US" smtClean="0"/>
-              <a:t>2019/4/16</a:t>
+              <a:t>2019/4/25</a:t>
             </a:fld>
             <a:endParaRPr lang="zh-CN" altLang="en-US"/>
           </a:p>
@@ -1822,7 +1823,7 @@
           <a:p>
             <a:fld id="{61E7D421-8CE4-4F19-BE4B-2C0A0F6FCEE0}" type="datetimeFigureOut">
               <a:rPr lang="zh-CN" altLang="en-US" smtClean="0"/>
-              <a:t>2019/4/16</a:t>
+              <a:t>2019/4/25</a:t>
             </a:fld>
             <a:endParaRPr lang="zh-CN" altLang="en-US"/>
           </a:p>
@@ -2099,7 +2100,7 @@
           <a:p>
             <a:fld id="{61E7D421-8CE4-4F19-BE4B-2C0A0F6FCEE0}" type="datetimeFigureOut">
               <a:rPr lang="zh-CN" altLang="en-US" smtClean="0"/>
-              <a:t>2019/4/16</a:t>
+              <a:t>2019/4/25</a:t>
             </a:fld>
             <a:endParaRPr lang="zh-CN" altLang="en-US"/>
           </a:p>
@@ -2352,7 +2353,7 @@
           <a:p>
             <a:fld id="{61E7D421-8CE4-4F19-BE4B-2C0A0F6FCEE0}" type="datetimeFigureOut">
               <a:rPr lang="zh-CN" altLang="en-US" smtClean="0"/>
-              <a:t>2019/4/16</a:t>
+              <a:t>2019/4/25</a:t>
             </a:fld>
             <a:endParaRPr lang="zh-CN" altLang="en-US"/>
           </a:p>
@@ -2565,7 +2566,7 @@
           <a:p>
             <a:fld id="{61E7D421-8CE4-4F19-BE4B-2C0A0F6FCEE0}" type="datetimeFigureOut">
               <a:rPr lang="zh-CN" altLang="en-US" smtClean="0"/>
-              <a:t>2019/4/16</a:t>
+              <a:t>2019/4/25</a:t>
             </a:fld>
             <a:endParaRPr lang="zh-CN" altLang="en-US"/>
           </a:p>
@@ -7855,6 +7856,1153 @@
 </p:sld>
 </file>
 
+<file path=ppt/slides/slide3.xml><?xml version="1.0" encoding="utf-8"?>
+<p:sld xmlns:a="http://schemas.openxmlformats.org/drawingml/2006/main" xmlns:r="http://schemas.openxmlformats.org/officeDocument/2006/relationships" xmlns:p="http://schemas.openxmlformats.org/presentationml/2006/main">
+  <p:cSld>
+    <p:spTree>
+      <p:nvGrpSpPr>
+        <p:cNvPr id="1" name=""/>
+        <p:cNvGrpSpPr/>
+        <p:nvPr/>
+      </p:nvGrpSpPr>
+      <p:grpSpPr>
+        <a:xfrm>
+          <a:off x="0" y="0"/>
+          <a:ext cx="0" cy="0"/>
+          <a:chOff x="0" y="0"/>
+          <a:chExt cx="0" cy="0"/>
+        </a:xfrm>
+      </p:grpSpPr>
+      <p:sp>
+        <p:nvSpPr>
+          <p:cNvPr id="4" name="Rectangle 3"/>
+          <p:cNvSpPr/>
+          <p:nvPr/>
+        </p:nvSpPr>
+        <p:spPr>
+          <a:xfrm>
+            <a:off x="4310063" y="2745581"/>
+            <a:ext cx="2914649" cy="600075"/>
+          </a:xfrm>
+          <a:prstGeom prst="rect">
+            <a:avLst/>
+          </a:prstGeom>
+        </p:spPr>
+        <p:style>
+          <a:lnRef idx="1">
+            <a:schemeClr val="accent1"/>
+          </a:lnRef>
+          <a:fillRef idx="2">
+            <a:schemeClr val="accent1"/>
+          </a:fillRef>
+          <a:effectRef idx="1">
+            <a:schemeClr val="accent1"/>
+          </a:effectRef>
+          <a:fontRef idx="minor">
+            <a:schemeClr val="dk1"/>
+          </a:fontRef>
+        </p:style>
+        <p:txBody>
+          <a:bodyPr rtlCol="0" anchor="ctr"/>
+          <a:lstStyle/>
+          <a:p>
+            <a:pPr algn="ctr"/>
+            <a:r>
+              <a:rPr lang="en-US" altLang="zh-CN" b="1" dirty="0" smtClean="0"/>
+              <a:t>SO</a:t>
+            </a:r>
+            <a:endParaRPr lang="zh-CN" altLang="en-US" b="1" dirty="0"/>
+          </a:p>
+        </p:txBody>
+      </p:sp>
+      <p:sp>
+        <p:nvSpPr>
+          <p:cNvPr id="7" name="Rectangle 6"/>
+          <p:cNvSpPr/>
+          <p:nvPr/>
+        </p:nvSpPr>
+        <p:spPr>
+          <a:xfrm>
+            <a:off x="4636067" y="635283"/>
+            <a:ext cx="2305050" cy="600075"/>
+          </a:xfrm>
+          <a:prstGeom prst="rect">
+            <a:avLst/>
+          </a:prstGeom>
+          <a:solidFill>
+            <a:schemeClr val="bg2">
+              <a:lumMod val="75000"/>
+            </a:schemeClr>
+          </a:solidFill>
+        </p:spPr>
+        <p:style>
+          <a:lnRef idx="1">
+            <a:schemeClr val="accent1"/>
+          </a:lnRef>
+          <a:fillRef idx="2">
+            <a:schemeClr val="accent1"/>
+          </a:fillRef>
+          <a:effectRef idx="1">
+            <a:schemeClr val="accent1"/>
+          </a:effectRef>
+          <a:fontRef idx="minor">
+            <a:schemeClr val="dk1"/>
+          </a:fontRef>
+        </p:style>
+        <p:txBody>
+          <a:bodyPr rtlCol="0" anchor="ctr"/>
+          <a:lstStyle/>
+          <a:p>
+            <a:pPr algn="ctr"/>
+            <a:r>
+              <a:rPr lang="en-US" altLang="zh-CN" dirty="0"/>
+              <a:t>VID</a:t>
+            </a:r>
+            <a:endParaRPr lang="zh-CN" altLang="en-US" dirty="0"/>
+          </a:p>
+        </p:txBody>
+      </p:sp>
+      <p:sp>
+        <p:nvSpPr>
+          <p:cNvPr id="8" name="Rectangle 7"/>
+          <p:cNvSpPr/>
+          <p:nvPr/>
+        </p:nvSpPr>
+        <p:spPr>
+          <a:xfrm>
+            <a:off x="8959833" y="2427183"/>
+            <a:ext cx="2305050" cy="600075"/>
+          </a:xfrm>
+          <a:prstGeom prst="rect">
+            <a:avLst/>
+          </a:prstGeom>
+          <a:solidFill>
+            <a:schemeClr val="bg2">
+              <a:lumMod val="75000"/>
+            </a:schemeClr>
+          </a:solidFill>
+        </p:spPr>
+        <p:style>
+          <a:lnRef idx="1">
+            <a:schemeClr val="accent1"/>
+          </a:lnRef>
+          <a:fillRef idx="2">
+            <a:schemeClr val="accent1"/>
+          </a:fillRef>
+          <a:effectRef idx="1">
+            <a:schemeClr val="accent1"/>
+          </a:effectRef>
+          <a:fontRef idx="minor">
+            <a:schemeClr val="dk1"/>
+          </a:fontRef>
+        </p:style>
+        <p:txBody>
+          <a:bodyPr rtlCol="0" anchor="ctr"/>
+          <a:lstStyle/>
+          <a:p>
+            <a:pPr algn="ctr"/>
+            <a:r>
+              <a:rPr lang="en-US" altLang="zh-CN" dirty="0"/>
+              <a:t>AAI</a:t>
+            </a:r>
+            <a:endParaRPr lang="zh-CN" altLang="en-US" dirty="0"/>
+          </a:p>
+        </p:txBody>
+      </p:sp>
+      <p:sp>
+        <p:nvSpPr>
+          <p:cNvPr id="9" name="Rectangle 8"/>
+          <p:cNvSpPr/>
+          <p:nvPr/>
+        </p:nvSpPr>
+        <p:spPr>
+          <a:xfrm>
+            <a:off x="8977907" y="3261228"/>
+            <a:ext cx="2305050" cy="600075"/>
+          </a:xfrm>
+          <a:prstGeom prst="rect">
+            <a:avLst/>
+          </a:prstGeom>
+          <a:solidFill>
+            <a:schemeClr val="bg2">
+              <a:lumMod val="75000"/>
+            </a:schemeClr>
+          </a:solidFill>
+        </p:spPr>
+        <p:style>
+          <a:lnRef idx="1">
+            <a:schemeClr val="accent1"/>
+          </a:lnRef>
+          <a:fillRef idx="2">
+            <a:schemeClr val="accent1"/>
+          </a:fillRef>
+          <a:effectRef idx="1">
+            <a:schemeClr val="accent1"/>
+          </a:effectRef>
+          <a:fontRef idx="minor">
+            <a:schemeClr val="dk1"/>
+          </a:fontRef>
+        </p:style>
+        <p:txBody>
+          <a:bodyPr rtlCol="0" anchor="ctr"/>
+          <a:lstStyle/>
+          <a:p>
+            <a:pPr algn="ctr"/>
+            <a:r>
+              <a:rPr lang="en-US" altLang="zh-CN" dirty="0"/>
+              <a:t>OOF</a:t>
+            </a:r>
+            <a:endParaRPr lang="zh-CN" altLang="en-US" dirty="0"/>
+          </a:p>
+        </p:txBody>
+      </p:sp>
+      <p:sp>
+        <p:nvSpPr>
+          <p:cNvPr id="10" name="Rectangle 9"/>
+          <p:cNvSpPr/>
+          <p:nvPr/>
+        </p:nvSpPr>
+        <p:spPr>
+          <a:xfrm>
+            <a:off x="8977907" y="4095273"/>
+            <a:ext cx="2305050" cy="600075"/>
+          </a:xfrm>
+          <a:prstGeom prst="rect">
+            <a:avLst/>
+          </a:prstGeom>
+          <a:solidFill>
+            <a:schemeClr val="bg2">
+              <a:lumMod val="75000"/>
+            </a:schemeClr>
+          </a:solidFill>
+        </p:spPr>
+        <p:style>
+          <a:lnRef idx="1">
+            <a:schemeClr val="accent1"/>
+          </a:lnRef>
+          <a:fillRef idx="2">
+            <a:schemeClr val="accent1"/>
+          </a:fillRef>
+          <a:effectRef idx="1">
+            <a:schemeClr val="accent1"/>
+          </a:effectRef>
+          <a:fontRef idx="minor">
+            <a:schemeClr val="dk1"/>
+          </a:fontRef>
+        </p:style>
+        <p:txBody>
+          <a:bodyPr rtlCol="0" anchor="ctr"/>
+          <a:lstStyle/>
+          <a:p>
+            <a:pPr algn="ctr"/>
+            <a:r>
+              <a:rPr lang="en-US" altLang="zh-CN" dirty="0"/>
+              <a:t>VFC</a:t>
+            </a:r>
+            <a:endParaRPr lang="zh-CN" altLang="en-US" dirty="0"/>
+          </a:p>
+        </p:txBody>
+      </p:sp>
+      <p:sp>
+        <p:nvSpPr>
+          <p:cNvPr id="11" name="Rectangle 10"/>
+          <p:cNvSpPr/>
+          <p:nvPr/>
+        </p:nvSpPr>
+        <p:spPr>
+          <a:xfrm>
+            <a:off x="2147661" y="4855879"/>
+            <a:ext cx="2305050" cy="600075"/>
+          </a:xfrm>
+          <a:prstGeom prst="rect">
+            <a:avLst/>
+          </a:prstGeom>
+          <a:solidFill>
+            <a:schemeClr val="bg2">
+              <a:lumMod val="75000"/>
+            </a:schemeClr>
+          </a:solidFill>
+        </p:spPr>
+        <p:style>
+          <a:lnRef idx="1">
+            <a:schemeClr val="accent1"/>
+          </a:lnRef>
+          <a:fillRef idx="2">
+            <a:schemeClr val="accent1"/>
+          </a:fillRef>
+          <a:effectRef idx="1">
+            <a:schemeClr val="accent1"/>
+          </a:effectRef>
+          <a:fontRef idx="minor">
+            <a:schemeClr val="dk1"/>
+          </a:fontRef>
+        </p:style>
+        <p:txBody>
+          <a:bodyPr rtlCol="0" anchor="ctr"/>
+          <a:lstStyle/>
+          <a:p>
+            <a:pPr algn="ctr"/>
+            <a:r>
+              <a:rPr lang="en-US" altLang="zh-CN" dirty="0" err="1"/>
+              <a:t>MultiVim</a:t>
+            </a:r>
+            <a:endParaRPr lang="zh-CN" altLang="en-US" dirty="0"/>
+          </a:p>
+        </p:txBody>
+      </p:sp>
+      <p:sp>
+        <p:nvSpPr>
+          <p:cNvPr id="12" name="Rectangle 11"/>
+          <p:cNvSpPr/>
+          <p:nvPr/>
+        </p:nvSpPr>
+        <p:spPr>
+          <a:xfrm>
+            <a:off x="700783" y="3887773"/>
+            <a:ext cx="2305050" cy="600075"/>
+          </a:xfrm>
+          <a:prstGeom prst="rect">
+            <a:avLst/>
+          </a:prstGeom>
+          <a:solidFill>
+            <a:schemeClr val="bg2">
+              <a:lumMod val="75000"/>
+            </a:schemeClr>
+          </a:solidFill>
+        </p:spPr>
+        <p:style>
+          <a:lnRef idx="1">
+            <a:schemeClr val="accent1"/>
+          </a:lnRef>
+          <a:fillRef idx="2">
+            <a:schemeClr val="accent1"/>
+          </a:fillRef>
+          <a:effectRef idx="1">
+            <a:schemeClr val="accent1"/>
+          </a:effectRef>
+          <a:fontRef idx="minor">
+            <a:schemeClr val="dk1"/>
+          </a:fontRef>
+        </p:style>
+        <p:txBody>
+          <a:bodyPr rtlCol="0" anchor="ctr"/>
+          <a:lstStyle/>
+          <a:p>
+            <a:pPr algn="ctr"/>
+            <a:r>
+              <a:rPr lang="en-US" altLang="zh-CN" dirty="0"/>
+              <a:t>Policy</a:t>
+            </a:r>
+            <a:endParaRPr lang="zh-CN" altLang="en-US" dirty="0"/>
+          </a:p>
+        </p:txBody>
+      </p:sp>
+      <p:sp>
+        <p:nvSpPr>
+          <p:cNvPr id="13" name="Rectangle 12"/>
+          <p:cNvSpPr/>
+          <p:nvPr/>
+        </p:nvSpPr>
+        <p:spPr>
+          <a:xfrm>
+            <a:off x="704850" y="2733673"/>
+            <a:ext cx="2305050" cy="600075"/>
+          </a:xfrm>
+          <a:prstGeom prst="rect">
+            <a:avLst/>
+          </a:prstGeom>
+          <a:solidFill>
+            <a:schemeClr val="bg2">
+              <a:lumMod val="75000"/>
+            </a:schemeClr>
+          </a:solidFill>
+        </p:spPr>
+        <p:style>
+          <a:lnRef idx="1">
+            <a:schemeClr val="accent1"/>
+          </a:lnRef>
+          <a:fillRef idx="2">
+            <a:schemeClr val="accent1"/>
+          </a:fillRef>
+          <a:effectRef idx="1">
+            <a:schemeClr val="accent1"/>
+          </a:effectRef>
+          <a:fontRef idx="minor">
+            <a:schemeClr val="dk1"/>
+          </a:fontRef>
+        </p:style>
+        <p:txBody>
+          <a:bodyPr rtlCol="0" anchor="ctr"/>
+          <a:lstStyle/>
+          <a:p>
+            <a:pPr algn="ctr"/>
+            <a:r>
+              <a:rPr lang="en-US" altLang="zh-CN" dirty="0"/>
+              <a:t>SDC</a:t>
+            </a:r>
+            <a:endParaRPr lang="zh-CN" altLang="en-US" dirty="0"/>
+          </a:p>
+        </p:txBody>
+      </p:sp>
+      <p:sp>
+        <p:nvSpPr>
+          <p:cNvPr id="14" name="Rectangle 13"/>
+          <p:cNvSpPr/>
+          <p:nvPr/>
+        </p:nvSpPr>
+        <p:spPr>
+          <a:xfrm>
+            <a:off x="2147661" y="654332"/>
+            <a:ext cx="2305050" cy="600075"/>
+          </a:xfrm>
+          <a:prstGeom prst="rect">
+            <a:avLst/>
+          </a:prstGeom>
+          <a:solidFill>
+            <a:schemeClr val="bg2">
+              <a:lumMod val="75000"/>
+            </a:schemeClr>
+          </a:solidFill>
+        </p:spPr>
+        <p:style>
+          <a:lnRef idx="1">
+            <a:schemeClr val="accent1"/>
+          </a:lnRef>
+          <a:fillRef idx="2">
+            <a:schemeClr val="accent1"/>
+          </a:fillRef>
+          <a:effectRef idx="1">
+            <a:schemeClr val="accent1"/>
+          </a:effectRef>
+          <a:fontRef idx="minor">
+            <a:schemeClr val="dk1"/>
+          </a:fontRef>
+        </p:style>
+        <p:txBody>
+          <a:bodyPr rtlCol="0" anchor="ctr"/>
+          <a:lstStyle/>
+          <a:p>
+            <a:pPr algn="ctr"/>
+            <a:r>
+              <a:rPr lang="en-US" altLang="zh-CN" dirty="0"/>
+              <a:t>Ext API</a:t>
+            </a:r>
+            <a:endParaRPr lang="zh-CN" altLang="en-US" dirty="0"/>
+          </a:p>
+        </p:txBody>
+      </p:sp>
+      <p:cxnSp>
+        <p:nvCxnSpPr>
+          <p:cNvPr id="18" name="Straight Arrow Connector 17"/>
+          <p:cNvCxnSpPr>
+            <a:stCxn id="4" idx="3"/>
+            <a:endCxn id="8" idx="1"/>
+          </p:cNvCxnSpPr>
+          <p:nvPr/>
+        </p:nvCxnSpPr>
+        <p:spPr>
+          <a:xfrm flipV="1">
+            <a:off x="7224712" y="2727221"/>
+            <a:ext cx="1735121" cy="318398"/>
+          </a:xfrm>
+          <a:prstGeom prst="straightConnector1">
+            <a:avLst/>
+          </a:prstGeom>
+          <a:ln w="41275">
+            <a:tailEnd type="stealth" w="lg" len="lg"/>
+          </a:ln>
+        </p:spPr>
+        <p:style>
+          <a:lnRef idx="1">
+            <a:schemeClr val="accent1"/>
+          </a:lnRef>
+          <a:fillRef idx="0">
+            <a:schemeClr val="accent1"/>
+          </a:fillRef>
+          <a:effectRef idx="0">
+            <a:schemeClr val="accent1"/>
+          </a:effectRef>
+          <a:fontRef idx="minor">
+            <a:schemeClr val="tx1"/>
+          </a:fontRef>
+        </p:style>
+      </p:cxnSp>
+      <p:cxnSp>
+        <p:nvCxnSpPr>
+          <p:cNvPr id="20" name="Straight Arrow Connector 19"/>
+          <p:cNvCxnSpPr>
+            <a:stCxn id="4" idx="3"/>
+            <a:endCxn id="9" idx="1"/>
+          </p:cNvCxnSpPr>
+          <p:nvPr/>
+        </p:nvCxnSpPr>
+        <p:spPr>
+          <a:xfrm>
+            <a:off x="7224712" y="3045619"/>
+            <a:ext cx="1753195" cy="515647"/>
+          </a:xfrm>
+          <a:prstGeom prst="straightConnector1">
+            <a:avLst/>
+          </a:prstGeom>
+          <a:ln w="41275">
+            <a:tailEnd type="stealth" w="lg" len="lg"/>
+          </a:ln>
+        </p:spPr>
+        <p:style>
+          <a:lnRef idx="1">
+            <a:schemeClr val="accent1"/>
+          </a:lnRef>
+          <a:fillRef idx="0">
+            <a:schemeClr val="accent1"/>
+          </a:fillRef>
+          <a:effectRef idx="0">
+            <a:schemeClr val="accent1"/>
+          </a:effectRef>
+          <a:fontRef idx="minor">
+            <a:schemeClr val="tx1"/>
+          </a:fontRef>
+        </p:style>
+      </p:cxnSp>
+      <p:cxnSp>
+        <p:nvCxnSpPr>
+          <p:cNvPr id="22" name="Straight Arrow Connector 21"/>
+          <p:cNvCxnSpPr>
+            <a:stCxn id="4" idx="2"/>
+            <a:endCxn id="10" idx="1"/>
+          </p:cNvCxnSpPr>
+          <p:nvPr/>
+        </p:nvCxnSpPr>
+        <p:spPr>
+          <a:xfrm>
+            <a:off x="5767388" y="3345656"/>
+            <a:ext cx="3210519" cy="1049655"/>
+          </a:xfrm>
+          <a:prstGeom prst="straightConnector1">
+            <a:avLst/>
+          </a:prstGeom>
+          <a:ln w="41275">
+            <a:tailEnd type="stealth" w="lg" len="lg"/>
+          </a:ln>
+        </p:spPr>
+        <p:style>
+          <a:lnRef idx="1">
+            <a:schemeClr val="accent1"/>
+          </a:lnRef>
+          <a:fillRef idx="0">
+            <a:schemeClr val="accent1"/>
+          </a:fillRef>
+          <a:effectRef idx="0">
+            <a:schemeClr val="accent1"/>
+          </a:effectRef>
+          <a:fontRef idx="minor">
+            <a:schemeClr val="tx1"/>
+          </a:fontRef>
+        </p:style>
+      </p:cxnSp>
+      <p:cxnSp>
+        <p:nvCxnSpPr>
+          <p:cNvPr id="24" name="Straight Arrow Connector 23"/>
+          <p:cNvCxnSpPr>
+            <a:stCxn id="4" idx="2"/>
+            <a:endCxn id="11" idx="0"/>
+          </p:cNvCxnSpPr>
+          <p:nvPr/>
+        </p:nvCxnSpPr>
+        <p:spPr>
+          <a:xfrm flipH="1">
+            <a:off x="3300186" y="3345656"/>
+            <a:ext cx="2467202" cy="1510223"/>
+          </a:xfrm>
+          <a:prstGeom prst="straightConnector1">
+            <a:avLst/>
+          </a:prstGeom>
+          <a:ln w="41275">
+            <a:tailEnd type="stealth" w="lg" len="lg"/>
+          </a:ln>
+        </p:spPr>
+        <p:style>
+          <a:lnRef idx="1">
+            <a:schemeClr val="accent1"/>
+          </a:lnRef>
+          <a:fillRef idx="0">
+            <a:schemeClr val="accent1"/>
+          </a:fillRef>
+          <a:effectRef idx="0">
+            <a:schemeClr val="accent1"/>
+          </a:effectRef>
+          <a:fontRef idx="minor">
+            <a:schemeClr val="tx1"/>
+          </a:fontRef>
+        </p:style>
+      </p:cxnSp>
+      <p:cxnSp>
+        <p:nvCxnSpPr>
+          <p:cNvPr id="26" name="Straight Arrow Connector 25"/>
+          <p:cNvCxnSpPr>
+            <a:stCxn id="13" idx="3"/>
+            <a:endCxn id="4" idx="1"/>
+          </p:cNvCxnSpPr>
+          <p:nvPr/>
+        </p:nvCxnSpPr>
+        <p:spPr>
+          <a:xfrm>
+            <a:off x="3009900" y="3033711"/>
+            <a:ext cx="1300163" cy="11908"/>
+          </a:xfrm>
+          <a:prstGeom prst="straightConnector1">
+            <a:avLst/>
+          </a:prstGeom>
+          <a:ln w="41275">
+            <a:tailEnd type="stealth" w="lg" len="lg"/>
+          </a:ln>
+        </p:spPr>
+        <p:style>
+          <a:lnRef idx="1">
+            <a:schemeClr val="accent1"/>
+          </a:lnRef>
+          <a:fillRef idx="0">
+            <a:schemeClr val="accent1"/>
+          </a:fillRef>
+          <a:effectRef idx="0">
+            <a:schemeClr val="accent1"/>
+          </a:effectRef>
+          <a:fontRef idx="minor">
+            <a:schemeClr val="tx1"/>
+          </a:fontRef>
+        </p:style>
+      </p:cxnSp>
+      <p:sp>
+        <p:nvSpPr>
+          <p:cNvPr id="29" name="Rectangle 28"/>
+          <p:cNvSpPr/>
+          <p:nvPr/>
+        </p:nvSpPr>
+        <p:spPr>
+          <a:xfrm>
+            <a:off x="7158018" y="635282"/>
+            <a:ext cx="2305050" cy="600075"/>
+          </a:xfrm>
+          <a:prstGeom prst="rect">
+            <a:avLst/>
+          </a:prstGeom>
+          <a:solidFill>
+            <a:schemeClr val="bg2">
+              <a:lumMod val="75000"/>
+            </a:schemeClr>
+          </a:solidFill>
+        </p:spPr>
+        <p:style>
+          <a:lnRef idx="1">
+            <a:schemeClr val="accent1"/>
+          </a:lnRef>
+          <a:fillRef idx="2">
+            <a:schemeClr val="accent1"/>
+          </a:fillRef>
+          <a:effectRef idx="1">
+            <a:schemeClr val="accent1"/>
+          </a:effectRef>
+          <a:fontRef idx="minor">
+            <a:schemeClr val="dk1"/>
+          </a:fontRef>
+        </p:style>
+        <p:txBody>
+          <a:bodyPr rtlCol="0" anchor="ctr"/>
+          <a:lstStyle/>
+          <a:p>
+            <a:pPr algn="ctr"/>
+            <a:r>
+              <a:rPr lang="en-US" altLang="zh-CN" dirty="0" smtClean="0"/>
+              <a:t>UUI</a:t>
+            </a:r>
+            <a:endParaRPr lang="zh-CN" altLang="en-US" dirty="0"/>
+          </a:p>
+        </p:txBody>
+      </p:sp>
+      <p:cxnSp>
+        <p:nvCxnSpPr>
+          <p:cNvPr id="31" name="Straight Arrow Connector 30"/>
+          <p:cNvCxnSpPr>
+            <a:stCxn id="29" idx="2"/>
+          </p:cNvCxnSpPr>
+          <p:nvPr/>
+        </p:nvCxnSpPr>
+        <p:spPr>
+          <a:xfrm flipH="1">
+            <a:off x="5888831" y="1235357"/>
+            <a:ext cx="2421712" cy="1491863"/>
+          </a:xfrm>
+          <a:prstGeom prst="straightConnector1">
+            <a:avLst/>
+          </a:prstGeom>
+          <a:ln w="41275">
+            <a:tailEnd type="stealth" w="lg" len="lg"/>
+          </a:ln>
+        </p:spPr>
+        <p:style>
+          <a:lnRef idx="1">
+            <a:schemeClr val="accent1"/>
+          </a:lnRef>
+          <a:fillRef idx="0">
+            <a:schemeClr val="accent1"/>
+          </a:fillRef>
+          <a:effectRef idx="0">
+            <a:schemeClr val="accent1"/>
+          </a:effectRef>
+          <a:fontRef idx="minor">
+            <a:schemeClr val="tx1"/>
+          </a:fontRef>
+        </p:style>
+      </p:cxnSp>
+      <p:cxnSp>
+        <p:nvCxnSpPr>
+          <p:cNvPr id="41" name="Straight Arrow Connector 40"/>
+          <p:cNvCxnSpPr>
+            <a:stCxn id="7" idx="2"/>
+            <a:endCxn id="4" idx="0"/>
+          </p:cNvCxnSpPr>
+          <p:nvPr/>
+        </p:nvCxnSpPr>
+        <p:spPr>
+          <a:xfrm flipH="1">
+            <a:off x="5767388" y="1235358"/>
+            <a:ext cx="21204" cy="1510223"/>
+          </a:xfrm>
+          <a:prstGeom prst="straightConnector1">
+            <a:avLst/>
+          </a:prstGeom>
+          <a:ln w="41275">
+            <a:tailEnd type="stealth" w="lg" len="lg"/>
+          </a:ln>
+        </p:spPr>
+        <p:style>
+          <a:lnRef idx="1">
+            <a:schemeClr val="accent1"/>
+          </a:lnRef>
+          <a:fillRef idx="0">
+            <a:schemeClr val="accent1"/>
+          </a:fillRef>
+          <a:effectRef idx="0">
+            <a:schemeClr val="accent1"/>
+          </a:effectRef>
+          <a:fontRef idx="minor">
+            <a:schemeClr val="tx1"/>
+          </a:fontRef>
+        </p:style>
+      </p:cxnSp>
+      <p:cxnSp>
+        <p:nvCxnSpPr>
+          <p:cNvPr id="44" name="Straight Arrow Connector 43"/>
+          <p:cNvCxnSpPr>
+            <a:stCxn id="14" idx="2"/>
+          </p:cNvCxnSpPr>
+          <p:nvPr/>
+        </p:nvCxnSpPr>
+        <p:spPr>
+          <a:xfrm>
+            <a:off x="3300186" y="1254407"/>
+            <a:ext cx="2364420" cy="1466702"/>
+          </a:xfrm>
+          <a:prstGeom prst="straightConnector1">
+            <a:avLst/>
+          </a:prstGeom>
+          <a:ln w="41275">
+            <a:tailEnd type="stealth" w="lg" len="lg"/>
+          </a:ln>
+        </p:spPr>
+        <p:style>
+          <a:lnRef idx="1">
+            <a:schemeClr val="accent1"/>
+          </a:lnRef>
+          <a:fillRef idx="0">
+            <a:schemeClr val="accent1"/>
+          </a:fillRef>
+          <a:effectRef idx="0">
+            <a:schemeClr val="accent1"/>
+          </a:effectRef>
+          <a:fontRef idx="minor">
+            <a:schemeClr val="tx1"/>
+          </a:fontRef>
+        </p:style>
+      </p:cxnSp>
+      <p:sp>
+        <p:nvSpPr>
+          <p:cNvPr id="50" name="Rectangle 49"/>
+          <p:cNvSpPr/>
+          <p:nvPr/>
+        </p:nvSpPr>
+        <p:spPr>
+          <a:xfrm>
+            <a:off x="704850" y="1603389"/>
+            <a:ext cx="2305050" cy="600075"/>
+          </a:xfrm>
+          <a:prstGeom prst="rect">
+            <a:avLst/>
+          </a:prstGeom>
+          <a:solidFill>
+            <a:schemeClr val="bg2">
+              <a:lumMod val="75000"/>
+            </a:schemeClr>
+          </a:solidFill>
+        </p:spPr>
+        <p:style>
+          <a:lnRef idx="1">
+            <a:schemeClr val="accent1"/>
+          </a:lnRef>
+          <a:fillRef idx="2">
+            <a:schemeClr val="accent1"/>
+          </a:fillRef>
+          <a:effectRef idx="1">
+            <a:schemeClr val="accent1"/>
+          </a:effectRef>
+          <a:fontRef idx="minor">
+            <a:schemeClr val="dk1"/>
+          </a:fontRef>
+        </p:style>
+        <p:txBody>
+          <a:bodyPr rtlCol="0" anchor="ctr"/>
+          <a:lstStyle/>
+          <a:p>
+            <a:pPr algn="ctr"/>
+            <a:r>
+              <a:rPr lang="en-US" altLang="zh-CN" dirty="0"/>
+              <a:t>CLI</a:t>
+            </a:r>
+            <a:endParaRPr lang="zh-CN" altLang="en-US" dirty="0"/>
+          </a:p>
+        </p:txBody>
+      </p:sp>
+      <p:cxnSp>
+        <p:nvCxnSpPr>
+          <p:cNvPr id="51" name="Straight Arrow Connector 50"/>
+          <p:cNvCxnSpPr>
+            <a:stCxn id="50" idx="3"/>
+          </p:cNvCxnSpPr>
+          <p:nvPr/>
+        </p:nvCxnSpPr>
+        <p:spPr>
+          <a:xfrm>
+            <a:off x="3009900" y="1903427"/>
+            <a:ext cx="2467202" cy="822875"/>
+          </a:xfrm>
+          <a:prstGeom prst="straightConnector1">
+            <a:avLst/>
+          </a:prstGeom>
+          <a:ln w="41275">
+            <a:tailEnd type="stealth" w="lg" len="lg"/>
+          </a:ln>
+        </p:spPr>
+        <p:style>
+          <a:lnRef idx="1">
+            <a:schemeClr val="accent1"/>
+          </a:lnRef>
+          <a:fillRef idx="0">
+            <a:schemeClr val="accent1"/>
+          </a:fillRef>
+          <a:effectRef idx="0">
+            <a:schemeClr val="accent1"/>
+          </a:effectRef>
+          <a:fontRef idx="minor">
+            <a:schemeClr val="tx1"/>
+          </a:fontRef>
+        </p:style>
+      </p:cxnSp>
+      <p:sp>
+        <p:nvSpPr>
+          <p:cNvPr id="57" name="Rectangle 56"/>
+          <p:cNvSpPr/>
+          <p:nvPr/>
+        </p:nvSpPr>
+        <p:spPr>
+          <a:xfrm>
+            <a:off x="7158018" y="5163288"/>
+            <a:ext cx="2305050" cy="600075"/>
+          </a:xfrm>
+          <a:prstGeom prst="rect">
+            <a:avLst/>
+          </a:prstGeom>
+          <a:solidFill>
+            <a:schemeClr val="bg2">
+              <a:lumMod val="75000"/>
+            </a:schemeClr>
+          </a:solidFill>
+        </p:spPr>
+        <p:style>
+          <a:lnRef idx="1">
+            <a:schemeClr val="accent1"/>
+          </a:lnRef>
+          <a:fillRef idx="2">
+            <a:schemeClr val="accent1"/>
+          </a:fillRef>
+          <a:effectRef idx="1">
+            <a:schemeClr val="accent1"/>
+          </a:effectRef>
+          <a:fontRef idx="minor">
+            <a:schemeClr val="dk1"/>
+          </a:fontRef>
+        </p:style>
+        <p:txBody>
+          <a:bodyPr rtlCol="0" anchor="ctr"/>
+          <a:lstStyle/>
+          <a:p>
+            <a:pPr algn="ctr"/>
+            <a:r>
+              <a:rPr lang="en-US" altLang="zh-CN" dirty="0"/>
+              <a:t>APPC</a:t>
+            </a:r>
+            <a:endParaRPr lang="zh-CN" altLang="en-US" dirty="0"/>
+          </a:p>
+        </p:txBody>
+      </p:sp>
+      <p:cxnSp>
+        <p:nvCxnSpPr>
+          <p:cNvPr id="58" name="Straight Arrow Connector 57"/>
+          <p:cNvCxnSpPr>
+            <a:stCxn id="4" idx="2"/>
+            <a:endCxn id="57" idx="0"/>
+          </p:cNvCxnSpPr>
+          <p:nvPr/>
+        </p:nvCxnSpPr>
+        <p:spPr>
+          <a:xfrm>
+            <a:off x="5767388" y="3345656"/>
+            <a:ext cx="2543155" cy="1817632"/>
+          </a:xfrm>
+          <a:prstGeom prst="straightConnector1">
+            <a:avLst/>
+          </a:prstGeom>
+          <a:ln w="41275">
+            <a:tailEnd type="stealth" w="lg" len="lg"/>
+          </a:ln>
+        </p:spPr>
+        <p:style>
+          <a:lnRef idx="1">
+            <a:schemeClr val="accent1"/>
+          </a:lnRef>
+          <a:fillRef idx="0">
+            <a:schemeClr val="accent1"/>
+          </a:fillRef>
+          <a:effectRef idx="0">
+            <a:schemeClr val="accent1"/>
+          </a:effectRef>
+          <a:fontRef idx="minor">
+            <a:schemeClr val="tx1"/>
+          </a:fontRef>
+        </p:style>
+      </p:cxnSp>
+      <p:sp>
+        <p:nvSpPr>
+          <p:cNvPr id="63" name="Rectangle 62"/>
+          <p:cNvSpPr/>
+          <p:nvPr/>
+        </p:nvSpPr>
+        <p:spPr>
+          <a:xfrm>
+            <a:off x="4636067" y="5597164"/>
+            <a:ext cx="2305050" cy="600075"/>
+          </a:xfrm>
+          <a:prstGeom prst="rect">
+            <a:avLst/>
+          </a:prstGeom>
+          <a:solidFill>
+            <a:schemeClr val="bg2">
+              <a:lumMod val="75000"/>
+            </a:schemeClr>
+          </a:solidFill>
+        </p:spPr>
+        <p:style>
+          <a:lnRef idx="1">
+            <a:schemeClr val="accent1"/>
+          </a:lnRef>
+          <a:fillRef idx="2">
+            <a:schemeClr val="accent1"/>
+          </a:fillRef>
+          <a:effectRef idx="1">
+            <a:schemeClr val="accent1"/>
+          </a:effectRef>
+          <a:fontRef idx="minor">
+            <a:schemeClr val="dk1"/>
+          </a:fontRef>
+        </p:style>
+        <p:txBody>
+          <a:bodyPr rtlCol="0" anchor="ctr"/>
+          <a:lstStyle/>
+          <a:p>
+            <a:pPr algn="ctr"/>
+            <a:r>
+              <a:rPr lang="en-US" altLang="zh-CN" dirty="0"/>
+              <a:t>SDNC</a:t>
+            </a:r>
+            <a:endParaRPr lang="zh-CN" altLang="en-US" dirty="0"/>
+          </a:p>
+        </p:txBody>
+      </p:sp>
+      <p:cxnSp>
+        <p:nvCxnSpPr>
+          <p:cNvPr id="65" name="Straight Arrow Connector 64"/>
+          <p:cNvCxnSpPr>
+            <a:stCxn id="4" idx="2"/>
+            <a:endCxn id="63" idx="0"/>
+          </p:cNvCxnSpPr>
+          <p:nvPr/>
+        </p:nvCxnSpPr>
+        <p:spPr>
+          <a:xfrm>
+            <a:off x="5767388" y="3345656"/>
+            <a:ext cx="21204" cy="2251508"/>
+          </a:xfrm>
+          <a:prstGeom prst="straightConnector1">
+            <a:avLst/>
+          </a:prstGeom>
+          <a:ln w="41275">
+            <a:tailEnd type="stealth" w="lg" len="lg"/>
+          </a:ln>
+        </p:spPr>
+        <p:style>
+          <a:lnRef idx="1">
+            <a:schemeClr val="accent1"/>
+          </a:lnRef>
+          <a:fillRef idx="0">
+            <a:schemeClr val="accent1"/>
+          </a:fillRef>
+          <a:effectRef idx="0">
+            <a:schemeClr val="accent1"/>
+          </a:effectRef>
+          <a:fontRef idx="minor">
+            <a:schemeClr val="tx1"/>
+          </a:fontRef>
+        </p:style>
+      </p:cxnSp>
+      <p:cxnSp>
+        <p:nvCxnSpPr>
+          <p:cNvPr id="69" name="Straight Arrow Connector 68"/>
+          <p:cNvCxnSpPr>
+            <a:stCxn id="12" idx="3"/>
+            <a:endCxn id="4" idx="1"/>
+          </p:cNvCxnSpPr>
+          <p:nvPr/>
+        </p:nvCxnSpPr>
+        <p:spPr>
+          <a:xfrm flipV="1">
+            <a:off x="3005833" y="3045619"/>
+            <a:ext cx="1304230" cy="1142192"/>
+          </a:xfrm>
+          <a:prstGeom prst="straightConnector1">
+            <a:avLst/>
+          </a:prstGeom>
+          <a:ln w="41275">
+            <a:tailEnd type="stealth" w="lg" len="lg"/>
+          </a:ln>
+        </p:spPr>
+        <p:style>
+          <a:lnRef idx="1">
+            <a:schemeClr val="accent1"/>
+          </a:lnRef>
+          <a:fillRef idx="0">
+            <a:schemeClr val="accent1"/>
+          </a:fillRef>
+          <a:effectRef idx="0">
+            <a:schemeClr val="accent1"/>
+          </a:effectRef>
+          <a:fontRef idx="minor">
+            <a:schemeClr val="tx1"/>
+          </a:fontRef>
+        </p:style>
+      </p:cxnSp>
+      <p:sp>
+        <p:nvSpPr>
+          <p:cNvPr id="92" name="Rectangle 91"/>
+          <p:cNvSpPr/>
+          <p:nvPr/>
+        </p:nvSpPr>
+        <p:spPr>
+          <a:xfrm>
+            <a:off x="8959833" y="1517890"/>
+            <a:ext cx="2305050" cy="600075"/>
+          </a:xfrm>
+          <a:prstGeom prst="rect">
+            <a:avLst/>
+          </a:prstGeom>
+          <a:solidFill>
+            <a:schemeClr val="bg2">
+              <a:lumMod val="75000"/>
+            </a:schemeClr>
+          </a:solidFill>
+        </p:spPr>
+        <p:style>
+          <a:lnRef idx="1">
+            <a:schemeClr val="accent1"/>
+          </a:lnRef>
+          <a:fillRef idx="2">
+            <a:schemeClr val="accent1"/>
+          </a:fillRef>
+          <a:effectRef idx="1">
+            <a:schemeClr val="accent1"/>
+          </a:effectRef>
+          <a:fontRef idx="minor">
+            <a:schemeClr val="dk1"/>
+          </a:fontRef>
+        </p:style>
+        <p:txBody>
+          <a:bodyPr rtlCol="0" anchor="ctr"/>
+          <a:lstStyle/>
+          <a:p>
+            <a:pPr algn="ctr"/>
+            <a:r>
+              <a:rPr lang="en-US" altLang="zh-CN" dirty="0" smtClean="0"/>
+              <a:t>DCAE</a:t>
+            </a:r>
+            <a:endParaRPr lang="zh-CN" altLang="en-US" dirty="0"/>
+          </a:p>
+        </p:txBody>
+      </p:sp>
+      <p:cxnSp>
+        <p:nvCxnSpPr>
+          <p:cNvPr id="94" name="Straight Arrow Connector 93"/>
+          <p:cNvCxnSpPr>
+            <a:stCxn id="92" idx="1"/>
+          </p:cNvCxnSpPr>
+          <p:nvPr/>
+        </p:nvCxnSpPr>
+        <p:spPr>
+          <a:xfrm flipH="1">
+            <a:off x="6076335" y="1817928"/>
+            <a:ext cx="2883498" cy="909292"/>
+          </a:xfrm>
+          <a:prstGeom prst="straightConnector1">
+            <a:avLst/>
+          </a:prstGeom>
+          <a:ln w="41275">
+            <a:tailEnd type="stealth" w="lg" len="lg"/>
+          </a:ln>
+        </p:spPr>
+        <p:style>
+          <a:lnRef idx="1">
+            <a:schemeClr val="accent1"/>
+          </a:lnRef>
+          <a:fillRef idx="0">
+            <a:schemeClr val="accent1"/>
+          </a:fillRef>
+          <a:effectRef idx="0">
+            <a:schemeClr val="accent1"/>
+          </a:effectRef>
+          <a:fontRef idx="minor">
+            <a:schemeClr val="tx1"/>
+          </a:fontRef>
+        </p:style>
+      </p:cxnSp>
+    </p:spTree>
+    <p:extLst>
+      <p:ext uri="{BB962C8B-B14F-4D97-AF65-F5344CB8AC3E}">
+        <p14:creationId xmlns:p14="http://schemas.microsoft.com/office/powerpoint/2010/main" val="2877272754"/>
+      </p:ext>
+    </p:extLst>
+  </p:cSld>
+  <p:clrMapOvr>
+    <a:masterClrMapping/>
+  </p:clrMapOvr>
+</p:sld>
+</file>
+
 <file path=ppt/theme/theme1.xml><?xml version="1.0" encoding="utf-8"?>
 <a:theme xmlns:a="http://schemas.openxmlformats.org/drawingml/2006/main" name="Office Theme">
   <a:themeElements>

</xml_diff>

<commit_message>
Update the Arc diags for SO
Issue-ID: SO-675

Change-Id: I55522f10344da148b83cda26820f82f54ebcec90
Signed-off-by: seshukm <seshu.kumar.m@huawei.com>
</commit_message>
<xml_diff>
--- a/docs/architecture/SO Internal Arc.pptx
+++ b/docs/architecture/SO Internal Arc.pptx
@@ -7,6 +7,7 @@
   <p:sldIdLst>
     <p:sldId id="257" r:id="rId2"/>
     <p:sldId id="258" r:id="rId3"/>
+    <p:sldId id="259" r:id="rId4"/>
   </p:sldIdLst>
   <p:sldSz cx="12192000" cy="6858000"/>
   <p:notesSz cx="6858000" cy="9144000"/>
@@ -244,7 +245,7 @@
           <a:p>
             <a:fld id="{61E7D421-8CE4-4F19-BE4B-2C0A0F6FCEE0}" type="datetimeFigureOut">
               <a:rPr lang="zh-CN" altLang="en-US" smtClean="0"/>
-              <a:t>2019/4/16</a:t>
+              <a:t>2019/4/25</a:t>
             </a:fld>
             <a:endParaRPr lang="zh-CN" altLang="en-US"/>
           </a:p>
@@ -414,7 +415,7 @@
           <a:p>
             <a:fld id="{61E7D421-8CE4-4F19-BE4B-2C0A0F6FCEE0}" type="datetimeFigureOut">
               <a:rPr lang="zh-CN" altLang="en-US" smtClean="0"/>
-              <a:t>2019/4/16</a:t>
+              <a:t>2019/4/25</a:t>
             </a:fld>
             <a:endParaRPr lang="zh-CN" altLang="en-US"/>
           </a:p>
@@ -594,7 +595,7 @@
           <a:p>
             <a:fld id="{61E7D421-8CE4-4F19-BE4B-2C0A0F6FCEE0}" type="datetimeFigureOut">
               <a:rPr lang="zh-CN" altLang="en-US" smtClean="0"/>
-              <a:t>2019/4/16</a:t>
+              <a:t>2019/4/25</a:t>
             </a:fld>
             <a:endParaRPr lang="zh-CN" altLang="en-US"/>
           </a:p>
@@ -764,7 +765,7 @@
           <a:p>
             <a:fld id="{61E7D421-8CE4-4F19-BE4B-2C0A0F6FCEE0}" type="datetimeFigureOut">
               <a:rPr lang="zh-CN" altLang="en-US" smtClean="0"/>
-              <a:t>2019/4/16</a:t>
+              <a:t>2019/4/25</a:t>
             </a:fld>
             <a:endParaRPr lang="zh-CN" altLang="en-US"/>
           </a:p>
@@ -1010,7 +1011,7 @@
           <a:p>
             <a:fld id="{61E7D421-8CE4-4F19-BE4B-2C0A0F6FCEE0}" type="datetimeFigureOut">
               <a:rPr lang="zh-CN" altLang="en-US" smtClean="0"/>
-              <a:t>2019/4/16</a:t>
+              <a:t>2019/4/25</a:t>
             </a:fld>
             <a:endParaRPr lang="zh-CN" altLang="en-US"/>
           </a:p>
@@ -1242,7 +1243,7 @@
           <a:p>
             <a:fld id="{61E7D421-8CE4-4F19-BE4B-2C0A0F6FCEE0}" type="datetimeFigureOut">
               <a:rPr lang="zh-CN" altLang="en-US" smtClean="0"/>
-              <a:t>2019/4/16</a:t>
+              <a:t>2019/4/25</a:t>
             </a:fld>
             <a:endParaRPr lang="zh-CN" altLang="en-US"/>
           </a:p>
@@ -1609,7 +1610,7 @@
           <a:p>
             <a:fld id="{61E7D421-8CE4-4F19-BE4B-2C0A0F6FCEE0}" type="datetimeFigureOut">
               <a:rPr lang="zh-CN" altLang="en-US" smtClean="0"/>
-              <a:t>2019/4/16</a:t>
+              <a:t>2019/4/25</a:t>
             </a:fld>
             <a:endParaRPr lang="zh-CN" altLang="en-US"/>
           </a:p>
@@ -1727,7 +1728,7 @@
           <a:p>
             <a:fld id="{61E7D421-8CE4-4F19-BE4B-2C0A0F6FCEE0}" type="datetimeFigureOut">
               <a:rPr lang="zh-CN" altLang="en-US" smtClean="0"/>
-              <a:t>2019/4/16</a:t>
+              <a:t>2019/4/25</a:t>
             </a:fld>
             <a:endParaRPr lang="zh-CN" altLang="en-US"/>
           </a:p>
@@ -1822,7 +1823,7 @@
           <a:p>
             <a:fld id="{61E7D421-8CE4-4F19-BE4B-2C0A0F6FCEE0}" type="datetimeFigureOut">
               <a:rPr lang="zh-CN" altLang="en-US" smtClean="0"/>
-              <a:t>2019/4/16</a:t>
+              <a:t>2019/4/25</a:t>
             </a:fld>
             <a:endParaRPr lang="zh-CN" altLang="en-US"/>
           </a:p>
@@ -2099,7 +2100,7 @@
           <a:p>
             <a:fld id="{61E7D421-8CE4-4F19-BE4B-2C0A0F6FCEE0}" type="datetimeFigureOut">
               <a:rPr lang="zh-CN" altLang="en-US" smtClean="0"/>
-              <a:t>2019/4/16</a:t>
+              <a:t>2019/4/25</a:t>
             </a:fld>
             <a:endParaRPr lang="zh-CN" altLang="en-US"/>
           </a:p>
@@ -2352,7 +2353,7 @@
           <a:p>
             <a:fld id="{61E7D421-8CE4-4F19-BE4B-2C0A0F6FCEE0}" type="datetimeFigureOut">
               <a:rPr lang="zh-CN" altLang="en-US" smtClean="0"/>
-              <a:t>2019/4/16</a:t>
+              <a:t>2019/4/25</a:t>
             </a:fld>
             <a:endParaRPr lang="zh-CN" altLang="en-US"/>
           </a:p>
@@ -2565,7 +2566,7 @@
           <a:p>
             <a:fld id="{61E7D421-8CE4-4F19-BE4B-2C0A0F6FCEE0}" type="datetimeFigureOut">
               <a:rPr lang="zh-CN" altLang="en-US" smtClean="0"/>
-              <a:t>2019/4/16</a:t>
+              <a:t>2019/4/25</a:t>
             </a:fld>
             <a:endParaRPr lang="zh-CN" altLang="en-US"/>
           </a:p>
@@ -7855,6 +7856,1153 @@
 </p:sld>
 </file>
 
+<file path=ppt/slides/slide3.xml><?xml version="1.0" encoding="utf-8"?>
+<p:sld xmlns:a="http://schemas.openxmlformats.org/drawingml/2006/main" xmlns:r="http://schemas.openxmlformats.org/officeDocument/2006/relationships" xmlns:p="http://schemas.openxmlformats.org/presentationml/2006/main">
+  <p:cSld>
+    <p:spTree>
+      <p:nvGrpSpPr>
+        <p:cNvPr id="1" name=""/>
+        <p:cNvGrpSpPr/>
+        <p:nvPr/>
+      </p:nvGrpSpPr>
+      <p:grpSpPr>
+        <a:xfrm>
+          <a:off x="0" y="0"/>
+          <a:ext cx="0" cy="0"/>
+          <a:chOff x="0" y="0"/>
+          <a:chExt cx="0" cy="0"/>
+        </a:xfrm>
+      </p:grpSpPr>
+      <p:sp>
+        <p:nvSpPr>
+          <p:cNvPr id="4" name="Rectangle 3"/>
+          <p:cNvSpPr/>
+          <p:nvPr/>
+        </p:nvSpPr>
+        <p:spPr>
+          <a:xfrm>
+            <a:off x="4310063" y="2745581"/>
+            <a:ext cx="2914649" cy="600075"/>
+          </a:xfrm>
+          <a:prstGeom prst="rect">
+            <a:avLst/>
+          </a:prstGeom>
+        </p:spPr>
+        <p:style>
+          <a:lnRef idx="1">
+            <a:schemeClr val="accent1"/>
+          </a:lnRef>
+          <a:fillRef idx="2">
+            <a:schemeClr val="accent1"/>
+          </a:fillRef>
+          <a:effectRef idx="1">
+            <a:schemeClr val="accent1"/>
+          </a:effectRef>
+          <a:fontRef idx="minor">
+            <a:schemeClr val="dk1"/>
+          </a:fontRef>
+        </p:style>
+        <p:txBody>
+          <a:bodyPr rtlCol="0" anchor="ctr"/>
+          <a:lstStyle/>
+          <a:p>
+            <a:pPr algn="ctr"/>
+            <a:r>
+              <a:rPr lang="en-US" altLang="zh-CN" b="1" dirty="0" smtClean="0"/>
+              <a:t>SO</a:t>
+            </a:r>
+            <a:endParaRPr lang="zh-CN" altLang="en-US" b="1" dirty="0"/>
+          </a:p>
+        </p:txBody>
+      </p:sp>
+      <p:sp>
+        <p:nvSpPr>
+          <p:cNvPr id="7" name="Rectangle 6"/>
+          <p:cNvSpPr/>
+          <p:nvPr/>
+        </p:nvSpPr>
+        <p:spPr>
+          <a:xfrm>
+            <a:off x="4636067" y="635283"/>
+            <a:ext cx="2305050" cy="600075"/>
+          </a:xfrm>
+          <a:prstGeom prst="rect">
+            <a:avLst/>
+          </a:prstGeom>
+          <a:solidFill>
+            <a:schemeClr val="bg2">
+              <a:lumMod val="75000"/>
+            </a:schemeClr>
+          </a:solidFill>
+        </p:spPr>
+        <p:style>
+          <a:lnRef idx="1">
+            <a:schemeClr val="accent1"/>
+          </a:lnRef>
+          <a:fillRef idx="2">
+            <a:schemeClr val="accent1"/>
+          </a:fillRef>
+          <a:effectRef idx="1">
+            <a:schemeClr val="accent1"/>
+          </a:effectRef>
+          <a:fontRef idx="minor">
+            <a:schemeClr val="dk1"/>
+          </a:fontRef>
+        </p:style>
+        <p:txBody>
+          <a:bodyPr rtlCol="0" anchor="ctr"/>
+          <a:lstStyle/>
+          <a:p>
+            <a:pPr algn="ctr"/>
+            <a:r>
+              <a:rPr lang="en-US" altLang="zh-CN" dirty="0"/>
+              <a:t>VID</a:t>
+            </a:r>
+            <a:endParaRPr lang="zh-CN" altLang="en-US" dirty="0"/>
+          </a:p>
+        </p:txBody>
+      </p:sp>
+      <p:sp>
+        <p:nvSpPr>
+          <p:cNvPr id="8" name="Rectangle 7"/>
+          <p:cNvSpPr/>
+          <p:nvPr/>
+        </p:nvSpPr>
+        <p:spPr>
+          <a:xfrm>
+            <a:off x="8959833" y="2427183"/>
+            <a:ext cx="2305050" cy="600075"/>
+          </a:xfrm>
+          <a:prstGeom prst="rect">
+            <a:avLst/>
+          </a:prstGeom>
+          <a:solidFill>
+            <a:schemeClr val="bg2">
+              <a:lumMod val="75000"/>
+            </a:schemeClr>
+          </a:solidFill>
+        </p:spPr>
+        <p:style>
+          <a:lnRef idx="1">
+            <a:schemeClr val="accent1"/>
+          </a:lnRef>
+          <a:fillRef idx="2">
+            <a:schemeClr val="accent1"/>
+          </a:fillRef>
+          <a:effectRef idx="1">
+            <a:schemeClr val="accent1"/>
+          </a:effectRef>
+          <a:fontRef idx="minor">
+            <a:schemeClr val="dk1"/>
+          </a:fontRef>
+        </p:style>
+        <p:txBody>
+          <a:bodyPr rtlCol="0" anchor="ctr"/>
+          <a:lstStyle/>
+          <a:p>
+            <a:pPr algn="ctr"/>
+            <a:r>
+              <a:rPr lang="en-US" altLang="zh-CN" dirty="0"/>
+              <a:t>AAI</a:t>
+            </a:r>
+            <a:endParaRPr lang="zh-CN" altLang="en-US" dirty="0"/>
+          </a:p>
+        </p:txBody>
+      </p:sp>
+      <p:sp>
+        <p:nvSpPr>
+          <p:cNvPr id="9" name="Rectangle 8"/>
+          <p:cNvSpPr/>
+          <p:nvPr/>
+        </p:nvSpPr>
+        <p:spPr>
+          <a:xfrm>
+            <a:off x="8977907" y="3261228"/>
+            <a:ext cx="2305050" cy="600075"/>
+          </a:xfrm>
+          <a:prstGeom prst="rect">
+            <a:avLst/>
+          </a:prstGeom>
+          <a:solidFill>
+            <a:schemeClr val="bg2">
+              <a:lumMod val="75000"/>
+            </a:schemeClr>
+          </a:solidFill>
+        </p:spPr>
+        <p:style>
+          <a:lnRef idx="1">
+            <a:schemeClr val="accent1"/>
+          </a:lnRef>
+          <a:fillRef idx="2">
+            <a:schemeClr val="accent1"/>
+          </a:fillRef>
+          <a:effectRef idx="1">
+            <a:schemeClr val="accent1"/>
+          </a:effectRef>
+          <a:fontRef idx="minor">
+            <a:schemeClr val="dk1"/>
+          </a:fontRef>
+        </p:style>
+        <p:txBody>
+          <a:bodyPr rtlCol="0" anchor="ctr"/>
+          <a:lstStyle/>
+          <a:p>
+            <a:pPr algn="ctr"/>
+            <a:r>
+              <a:rPr lang="en-US" altLang="zh-CN" dirty="0"/>
+              <a:t>OOF</a:t>
+            </a:r>
+            <a:endParaRPr lang="zh-CN" altLang="en-US" dirty="0"/>
+          </a:p>
+        </p:txBody>
+      </p:sp>
+      <p:sp>
+        <p:nvSpPr>
+          <p:cNvPr id="10" name="Rectangle 9"/>
+          <p:cNvSpPr/>
+          <p:nvPr/>
+        </p:nvSpPr>
+        <p:spPr>
+          <a:xfrm>
+            <a:off x="8977907" y="4095273"/>
+            <a:ext cx="2305050" cy="600075"/>
+          </a:xfrm>
+          <a:prstGeom prst="rect">
+            <a:avLst/>
+          </a:prstGeom>
+          <a:solidFill>
+            <a:schemeClr val="bg2">
+              <a:lumMod val="75000"/>
+            </a:schemeClr>
+          </a:solidFill>
+        </p:spPr>
+        <p:style>
+          <a:lnRef idx="1">
+            <a:schemeClr val="accent1"/>
+          </a:lnRef>
+          <a:fillRef idx="2">
+            <a:schemeClr val="accent1"/>
+          </a:fillRef>
+          <a:effectRef idx="1">
+            <a:schemeClr val="accent1"/>
+          </a:effectRef>
+          <a:fontRef idx="minor">
+            <a:schemeClr val="dk1"/>
+          </a:fontRef>
+        </p:style>
+        <p:txBody>
+          <a:bodyPr rtlCol="0" anchor="ctr"/>
+          <a:lstStyle/>
+          <a:p>
+            <a:pPr algn="ctr"/>
+            <a:r>
+              <a:rPr lang="en-US" altLang="zh-CN" dirty="0"/>
+              <a:t>VFC</a:t>
+            </a:r>
+            <a:endParaRPr lang="zh-CN" altLang="en-US" dirty="0"/>
+          </a:p>
+        </p:txBody>
+      </p:sp>
+      <p:sp>
+        <p:nvSpPr>
+          <p:cNvPr id="11" name="Rectangle 10"/>
+          <p:cNvSpPr/>
+          <p:nvPr/>
+        </p:nvSpPr>
+        <p:spPr>
+          <a:xfrm>
+            <a:off x="2147661" y="4855879"/>
+            <a:ext cx="2305050" cy="600075"/>
+          </a:xfrm>
+          <a:prstGeom prst="rect">
+            <a:avLst/>
+          </a:prstGeom>
+          <a:solidFill>
+            <a:schemeClr val="bg2">
+              <a:lumMod val="75000"/>
+            </a:schemeClr>
+          </a:solidFill>
+        </p:spPr>
+        <p:style>
+          <a:lnRef idx="1">
+            <a:schemeClr val="accent1"/>
+          </a:lnRef>
+          <a:fillRef idx="2">
+            <a:schemeClr val="accent1"/>
+          </a:fillRef>
+          <a:effectRef idx="1">
+            <a:schemeClr val="accent1"/>
+          </a:effectRef>
+          <a:fontRef idx="minor">
+            <a:schemeClr val="dk1"/>
+          </a:fontRef>
+        </p:style>
+        <p:txBody>
+          <a:bodyPr rtlCol="0" anchor="ctr"/>
+          <a:lstStyle/>
+          <a:p>
+            <a:pPr algn="ctr"/>
+            <a:r>
+              <a:rPr lang="en-US" altLang="zh-CN" dirty="0" err="1"/>
+              <a:t>MultiVim</a:t>
+            </a:r>
+            <a:endParaRPr lang="zh-CN" altLang="en-US" dirty="0"/>
+          </a:p>
+        </p:txBody>
+      </p:sp>
+      <p:sp>
+        <p:nvSpPr>
+          <p:cNvPr id="12" name="Rectangle 11"/>
+          <p:cNvSpPr/>
+          <p:nvPr/>
+        </p:nvSpPr>
+        <p:spPr>
+          <a:xfrm>
+            <a:off x="700783" y="3887773"/>
+            <a:ext cx="2305050" cy="600075"/>
+          </a:xfrm>
+          <a:prstGeom prst="rect">
+            <a:avLst/>
+          </a:prstGeom>
+          <a:solidFill>
+            <a:schemeClr val="bg2">
+              <a:lumMod val="75000"/>
+            </a:schemeClr>
+          </a:solidFill>
+        </p:spPr>
+        <p:style>
+          <a:lnRef idx="1">
+            <a:schemeClr val="accent1"/>
+          </a:lnRef>
+          <a:fillRef idx="2">
+            <a:schemeClr val="accent1"/>
+          </a:fillRef>
+          <a:effectRef idx="1">
+            <a:schemeClr val="accent1"/>
+          </a:effectRef>
+          <a:fontRef idx="minor">
+            <a:schemeClr val="dk1"/>
+          </a:fontRef>
+        </p:style>
+        <p:txBody>
+          <a:bodyPr rtlCol="0" anchor="ctr"/>
+          <a:lstStyle/>
+          <a:p>
+            <a:pPr algn="ctr"/>
+            <a:r>
+              <a:rPr lang="en-US" altLang="zh-CN" dirty="0"/>
+              <a:t>Policy</a:t>
+            </a:r>
+            <a:endParaRPr lang="zh-CN" altLang="en-US" dirty="0"/>
+          </a:p>
+        </p:txBody>
+      </p:sp>
+      <p:sp>
+        <p:nvSpPr>
+          <p:cNvPr id="13" name="Rectangle 12"/>
+          <p:cNvSpPr/>
+          <p:nvPr/>
+        </p:nvSpPr>
+        <p:spPr>
+          <a:xfrm>
+            <a:off x="704850" y="2733673"/>
+            <a:ext cx="2305050" cy="600075"/>
+          </a:xfrm>
+          <a:prstGeom prst="rect">
+            <a:avLst/>
+          </a:prstGeom>
+          <a:solidFill>
+            <a:schemeClr val="bg2">
+              <a:lumMod val="75000"/>
+            </a:schemeClr>
+          </a:solidFill>
+        </p:spPr>
+        <p:style>
+          <a:lnRef idx="1">
+            <a:schemeClr val="accent1"/>
+          </a:lnRef>
+          <a:fillRef idx="2">
+            <a:schemeClr val="accent1"/>
+          </a:fillRef>
+          <a:effectRef idx="1">
+            <a:schemeClr val="accent1"/>
+          </a:effectRef>
+          <a:fontRef idx="minor">
+            <a:schemeClr val="dk1"/>
+          </a:fontRef>
+        </p:style>
+        <p:txBody>
+          <a:bodyPr rtlCol="0" anchor="ctr"/>
+          <a:lstStyle/>
+          <a:p>
+            <a:pPr algn="ctr"/>
+            <a:r>
+              <a:rPr lang="en-US" altLang="zh-CN" dirty="0"/>
+              <a:t>SDC</a:t>
+            </a:r>
+            <a:endParaRPr lang="zh-CN" altLang="en-US" dirty="0"/>
+          </a:p>
+        </p:txBody>
+      </p:sp>
+      <p:sp>
+        <p:nvSpPr>
+          <p:cNvPr id="14" name="Rectangle 13"/>
+          <p:cNvSpPr/>
+          <p:nvPr/>
+        </p:nvSpPr>
+        <p:spPr>
+          <a:xfrm>
+            <a:off x="2147661" y="654332"/>
+            <a:ext cx="2305050" cy="600075"/>
+          </a:xfrm>
+          <a:prstGeom prst="rect">
+            <a:avLst/>
+          </a:prstGeom>
+          <a:solidFill>
+            <a:schemeClr val="bg2">
+              <a:lumMod val="75000"/>
+            </a:schemeClr>
+          </a:solidFill>
+        </p:spPr>
+        <p:style>
+          <a:lnRef idx="1">
+            <a:schemeClr val="accent1"/>
+          </a:lnRef>
+          <a:fillRef idx="2">
+            <a:schemeClr val="accent1"/>
+          </a:fillRef>
+          <a:effectRef idx="1">
+            <a:schemeClr val="accent1"/>
+          </a:effectRef>
+          <a:fontRef idx="minor">
+            <a:schemeClr val="dk1"/>
+          </a:fontRef>
+        </p:style>
+        <p:txBody>
+          <a:bodyPr rtlCol="0" anchor="ctr"/>
+          <a:lstStyle/>
+          <a:p>
+            <a:pPr algn="ctr"/>
+            <a:r>
+              <a:rPr lang="en-US" altLang="zh-CN" dirty="0"/>
+              <a:t>Ext API</a:t>
+            </a:r>
+            <a:endParaRPr lang="zh-CN" altLang="en-US" dirty="0"/>
+          </a:p>
+        </p:txBody>
+      </p:sp>
+      <p:cxnSp>
+        <p:nvCxnSpPr>
+          <p:cNvPr id="18" name="Straight Arrow Connector 17"/>
+          <p:cNvCxnSpPr>
+            <a:stCxn id="4" idx="3"/>
+            <a:endCxn id="8" idx="1"/>
+          </p:cNvCxnSpPr>
+          <p:nvPr/>
+        </p:nvCxnSpPr>
+        <p:spPr>
+          <a:xfrm flipV="1">
+            <a:off x="7224712" y="2727221"/>
+            <a:ext cx="1735121" cy="318398"/>
+          </a:xfrm>
+          <a:prstGeom prst="straightConnector1">
+            <a:avLst/>
+          </a:prstGeom>
+          <a:ln w="41275">
+            <a:tailEnd type="stealth" w="lg" len="lg"/>
+          </a:ln>
+        </p:spPr>
+        <p:style>
+          <a:lnRef idx="1">
+            <a:schemeClr val="accent1"/>
+          </a:lnRef>
+          <a:fillRef idx="0">
+            <a:schemeClr val="accent1"/>
+          </a:fillRef>
+          <a:effectRef idx="0">
+            <a:schemeClr val="accent1"/>
+          </a:effectRef>
+          <a:fontRef idx="minor">
+            <a:schemeClr val="tx1"/>
+          </a:fontRef>
+        </p:style>
+      </p:cxnSp>
+      <p:cxnSp>
+        <p:nvCxnSpPr>
+          <p:cNvPr id="20" name="Straight Arrow Connector 19"/>
+          <p:cNvCxnSpPr>
+            <a:stCxn id="4" idx="3"/>
+            <a:endCxn id="9" idx="1"/>
+          </p:cNvCxnSpPr>
+          <p:nvPr/>
+        </p:nvCxnSpPr>
+        <p:spPr>
+          <a:xfrm>
+            <a:off x="7224712" y="3045619"/>
+            <a:ext cx="1753195" cy="515647"/>
+          </a:xfrm>
+          <a:prstGeom prst="straightConnector1">
+            <a:avLst/>
+          </a:prstGeom>
+          <a:ln w="41275">
+            <a:tailEnd type="stealth" w="lg" len="lg"/>
+          </a:ln>
+        </p:spPr>
+        <p:style>
+          <a:lnRef idx="1">
+            <a:schemeClr val="accent1"/>
+          </a:lnRef>
+          <a:fillRef idx="0">
+            <a:schemeClr val="accent1"/>
+          </a:fillRef>
+          <a:effectRef idx="0">
+            <a:schemeClr val="accent1"/>
+          </a:effectRef>
+          <a:fontRef idx="minor">
+            <a:schemeClr val="tx1"/>
+          </a:fontRef>
+        </p:style>
+      </p:cxnSp>
+      <p:cxnSp>
+        <p:nvCxnSpPr>
+          <p:cNvPr id="22" name="Straight Arrow Connector 21"/>
+          <p:cNvCxnSpPr>
+            <a:stCxn id="4" idx="2"/>
+            <a:endCxn id="10" idx="1"/>
+          </p:cNvCxnSpPr>
+          <p:nvPr/>
+        </p:nvCxnSpPr>
+        <p:spPr>
+          <a:xfrm>
+            <a:off x="5767388" y="3345656"/>
+            <a:ext cx="3210519" cy="1049655"/>
+          </a:xfrm>
+          <a:prstGeom prst="straightConnector1">
+            <a:avLst/>
+          </a:prstGeom>
+          <a:ln w="41275">
+            <a:tailEnd type="stealth" w="lg" len="lg"/>
+          </a:ln>
+        </p:spPr>
+        <p:style>
+          <a:lnRef idx="1">
+            <a:schemeClr val="accent1"/>
+          </a:lnRef>
+          <a:fillRef idx="0">
+            <a:schemeClr val="accent1"/>
+          </a:fillRef>
+          <a:effectRef idx="0">
+            <a:schemeClr val="accent1"/>
+          </a:effectRef>
+          <a:fontRef idx="minor">
+            <a:schemeClr val="tx1"/>
+          </a:fontRef>
+        </p:style>
+      </p:cxnSp>
+      <p:cxnSp>
+        <p:nvCxnSpPr>
+          <p:cNvPr id="24" name="Straight Arrow Connector 23"/>
+          <p:cNvCxnSpPr>
+            <a:stCxn id="4" idx="2"/>
+            <a:endCxn id="11" idx="0"/>
+          </p:cNvCxnSpPr>
+          <p:nvPr/>
+        </p:nvCxnSpPr>
+        <p:spPr>
+          <a:xfrm flipH="1">
+            <a:off x="3300186" y="3345656"/>
+            <a:ext cx="2467202" cy="1510223"/>
+          </a:xfrm>
+          <a:prstGeom prst="straightConnector1">
+            <a:avLst/>
+          </a:prstGeom>
+          <a:ln w="41275">
+            <a:tailEnd type="stealth" w="lg" len="lg"/>
+          </a:ln>
+        </p:spPr>
+        <p:style>
+          <a:lnRef idx="1">
+            <a:schemeClr val="accent1"/>
+          </a:lnRef>
+          <a:fillRef idx="0">
+            <a:schemeClr val="accent1"/>
+          </a:fillRef>
+          <a:effectRef idx="0">
+            <a:schemeClr val="accent1"/>
+          </a:effectRef>
+          <a:fontRef idx="minor">
+            <a:schemeClr val="tx1"/>
+          </a:fontRef>
+        </p:style>
+      </p:cxnSp>
+      <p:cxnSp>
+        <p:nvCxnSpPr>
+          <p:cNvPr id="26" name="Straight Arrow Connector 25"/>
+          <p:cNvCxnSpPr>
+            <a:stCxn id="13" idx="3"/>
+            <a:endCxn id="4" idx="1"/>
+          </p:cNvCxnSpPr>
+          <p:nvPr/>
+        </p:nvCxnSpPr>
+        <p:spPr>
+          <a:xfrm>
+            <a:off x="3009900" y="3033711"/>
+            <a:ext cx="1300163" cy="11908"/>
+          </a:xfrm>
+          <a:prstGeom prst="straightConnector1">
+            <a:avLst/>
+          </a:prstGeom>
+          <a:ln w="41275">
+            <a:tailEnd type="stealth" w="lg" len="lg"/>
+          </a:ln>
+        </p:spPr>
+        <p:style>
+          <a:lnRef idx="1">
+            <a:schemeClr val="accent1"/>
+          </a:lnRef>
+          <a:fillRef idx="0">
+            <a:schemeClr val="accent1"/>
+          </a:fillRef>
+          <a:effectRef idx="0">
+            <a:schemeClr val="accent1"/>
+          </a:effectRef>
+          <a:fontRef idx="minor">
+            <a:schemeClr val="tx1"/>
+          </a:fontRef>
+        </p:style>
+      </p:cxnSp>
+      <p:sp>
+        <p:nvSpPr>
+          <p:cNvPr id="29" name="Rectangle 28"/>
+          <p:cNvSpPr/>
+          <p:nvPr/>
+        </p:nvSpPr>
+        <p:spPr>
+          <a:xfrm>
+            <a:off x="7158018" y="635282"/>
+            <a:ext cx="2305050" cy="600075"/>
+          </a:xfrm>
+          <a:prstGeom prst="rect">
+            <a:avLst/>
+          </a:prstGeom>
+          <a:solidFill>
+            <a:schemeClr val="bg2">
+              <a:lumMod val="75000"/>
+            </a:schemeClr>
+          </a:solidFill>
+        </p:spPr>
+        <p:style>
+          <a:lnRef idx="1">
+            <a:schemeClr val="accent1"/>
+          </a:lnRef>
+          <a:fillRef idx="2">
+            <a:schemeClr val="accent1"/>
+          </a:fillRef>
+          <a:effectRef idx="1">
+            <a:schemeClr val="accent1"/>
+          </a:effectRef>
+          <a:fontRef idx="minor">
+            <a:schemeClr val="dk1"/>
+          </a:fontRef>
+        </p:style>
+        <p:txBody>
+          <a:bodyPr rtlCol="0" anchor="ctr"/>
+          <a:lstStyle/>
+          <a:p>
+            <a:pPr algn="ctr"/>
+            <a:r>
+              <a:rPr lang="en-US" altLang="zh-CN" dirty="0" smtClean="0"/>
+              <a:t>UUI</a:t>
+            </a:r>
+            <a:endParaRPr lang="zh-CN" altLang="en-US" dirty="0"/>
+          </a:p>
+        </p:txBody>
+      </p:sp>
+      <p:cxnSp>
+        <p:nvCxnSpPr>
+          <p:cNvPr id="31" name="Straight Arrow Connector 30"/>
+          <p:cNvCxnSpPr>
+            <a:stCxn id="29" idx="2"/>
+          </p:cNvCxnSpPr>
+          <p:nvPr/>
+        </p:nvCxnSpPr>
+        <p:spPr>
+          <a:xfrm flipH="1">
+            <a:off x="5888831" y="1235357"/>
+            <a:ext cx="2421712" cy="1491863"/>
+          </a:xfrm>
+          <a:prstGeom prst="straightConnector1">
+            <a:avLst/>
+          </a:prstGeom>
+          <a:ln w="41275">
+            <a:tailEnd type="stealth" w="lg" len="lg"/>
+          </a:ln>
+        </p:spPr>
+        <p:style>
+          <a:lnRef idx="1">
+            <a:schemeClr val="accent1"/>
+          </a:lnRef>
+          <a:fillRef idx="0">
+            <a:schemeClr val="accent1"/>
+          </a:fillRef>
+          <a:effectRef idx="0">
+            <a:schemeClr val="accent1"/>
+          </a:effectRef>
+          <a:fontRef idx="minor">
+            <a:schemeClr val="tx1"/>
+          </a:fontRef>
+        </p:style>
+      </p:cxnSp>
+      <p:cxnSp>
+        <p:nvCxnSpPr>
+          <p:cNvPr id="41" name="Straight Arrow Connector 40"/>
+          <p:cNvCxnSpPr>
+            <a:stCxn id="7" idx="2"/>
+            <a:endCxn id="4" idx="0"/>
+          </p:cNvCxnSpPr>
+          <p:nvPr/>
+        </p:nvCxnSpPr>
+        <p:spPr>
+          <a:xfrm flipH="1">
+            <a:off x="5767388" y="1235358"/>
+            <a:ext cx="21204" cy="1510223"/>
+          </a:xfrm>
+          <a:prstGeom prst="straightConnector1">
+            <a:avLst/>
+          </a:prstGeom>
+          <a:ln w="41275">
+            <a:tailEnd type="stealth" w="lg" len="lg"/>
+          </a:ln>
+        </p:spPr>
+        <p:style>
+          <a:lnRef idx="1">
+            <a:schemeClr val="accent1"/>
+          </a:lnRef>
+          <a:fillRef idx="0">
+            <a:schemeClr val="accent1"/>
+          </a:fillRef>
+          <a:effectRef idx="0">
+            <a:schemeClr val="accent1"/>
+          </a:effectRef>
+          <a:fontRef idx="minor">
+            <a:schemeClr val="tx1"/>
+          </a:fontRef>
+        </p:style>
+      </p:cxnSp>
+      <p:cxnSp>
+        <p:nvCxnSpPr>
+          <p:cNvPr id="44" name="Straight Arrow Connector 43"/>
+          <p:cNvCxnSpPr>
+            <a:stCxn id="14" idx="2"/>
+          </p:cNvCxnSpPr>
+          <p:nvPr/>
+        </p:nvCxnSpPr>
+        <p:spPr>
+          <a:xfrm>
+            <a:off x="3300186" y="1254407"/>
+            <a:ext cx="2364420" cy="1466702"/>
+          </a:xfrm>
+          <a:prstGeom prst="straightConnector1">
+            <a:avLst/>
+          </a:prstGeom>
+          <a:ln w="41275">
+            <a:tailEnd type="stealth" w="lg" len="lg"/>
+          </a:ln>
+        </p:spPr>
+        <p:style>
+          <a:lnRef idx="1">
+            <a:schemeClr val="accent1"/>
+          </a:lnRef>
+          <a:fillRef idx="0">
+            <a:schemeClr val="accent1"/>
+          </a:fillRef>
+          <a:effectRef idx="0">
+            <a:schemeClr val="accent1"/>
+          </a:effectRef>
+          <a:fontRef idx="minor">
+            <a:schemeClr val="tx1"/>
+          </a:fontRef>
+        </p:style>
+      </p:cxnSp>
+      <p:sp>
+        <p:nvSpPr>
+          <p:cNvPr id="50" name="Rectangle 49"/>
+          <p:cNvSpPr/>
+          <p:nvPr/>
+        </p:nvSpPr>
+        <p:spPr>
+          <a:xfrm>
+            <a:off x="704850" y="1603389"/>
+            <a:ext cx="2305050" cy="600075"/>
+          </a:xfrm>
+          <a:prstGeom prst="rect">
+            <a:avLst/>
+          </a:prstGeom>
+          <a:solidFill>
+            <a:schemeClr val="bg2">
+              <a:lumMod val="75000"/>
+            </a:schemeClr>
+          </a:solidFill>
+        </p:spPr>
+        <p:style>
+          <a:lnRef idx="1">
+            <a:schemeClr val="accent1"/>
+          </a:lnRef>
+          <a:fillRef idx="2">
+            <a:schemeClr val="accent1"/>
+          </a:fillRef>
+          <a:effectRef idx="1">
+            <a:schemeClr val="accent1"/>
+          </a:effectRef>
+          <a:fontRef idx="minor">
+            <a:schemeClr val="dk1"/>
+          </a:fontRef>
+        </p:style>
+        <p:txBody>
+          <a:bodyPr rtlCol="0" anchor="ctr"/>
+          <a:lstStyle/>
+          <a:p>
+            <a:pPr algn="ctr"/>
+            <a:r>
+              <a:rPr lang="en-US" altLang="zh-CN" dirty="0"/>
+              <a:t>CLI</a:t>
+            </a:r>
+            <a:endParaRPr lang="zh-CN" altLang="en-US" dirty="0"/>
+          </a:p>
+        </p:txBody>
+      </p:sp>
+      <p:cxnSp>
+        <p:nvCxnSpPr>
+          <p:cNvPr id="51" name="Straight Arrow Connector 50"/>
+          <p:cNvCxnSpPr>
+            <a:stCxn id="50" idx="3"/>
+          </p:cNvCxnSpPr>
+          <p:nvPr/>
+        </p:nvCxnSpPr>
+        <p:spPr>
+          <a:xfrm>
+            <a:off x="3009900" y="1903427"/>
+            <a:ext cx="2467202" cy="822875"/>
+          </a:xfrm>
+          <a:prstGeom prst="straightConnector1">
+            <a:avLst/>
+          </a:prstGeom>
+          <a:ln w="41275">
+            <a:tailEnd type="stealth" w="lg" len="lg"/>
+          </a:ln>
+        </p:spPr>
+        <p:style>
+          <a:lnRef idx="1">
+            <a:schemeClr val="accent1"/>
+          </a:lnRef>
+          <a:fillRef idx="0">
+            <a:schemeClr val="accent1"/>
+          </a:fillRef>
+          <a:effectRef idx="0">
+            <a:schemeClr val="accent1"/>
+          </a:effectRef>
+          <a:fontRef idx="minor">
+            <a:schemeClr val="tx1"/>
+          </a:fontRef>
+        </p:style>
+      </p:cxnSp>
+      <p:sp>
+        <p:nvSpPr>
+          <p:cNvPr id="57" name="Rectangle 56"/>
+          <p:cNvSpPr/>
+          <p:nvPr/>
+        </p:nvSpPr>
+        <p:spPr>
+          <a:xfrm>
+            <a:off x="7158018" y="5163288"/>
+            <a:ext cx="2305050" cy="600075"/>
+          </a:xfrm>
+          <a:prstGeom prst="rect">
+            <a:avLst/>
+          </a:prstGeom>
+          <a:solidFill>
+            <a:schemeClr val="bg2">
+              <a:lumMod val="75000"/>
+            </a:schemeClr>
+          </a:solidFill>
+        </p:spPr>
+        <p:style>
+          <a:lnRef idx="1">
+            <a:schemeClr val="accent1"/>
+          </a:lnRef>
+          <a:fillRef idx="2">
+            <a:schemeClr val="accent1"/>
+          </a:fillRef>
+          <a:effectRef idx="1">
+            <a:schemeClr val="accent1"/>
+          </a:effectRef>
+          <a:fontRef idx="minor">
+            <a:schemeClr val="dk1"/>
+          </a:fontRef>
+        </p:style>
+        <p:txBody>
+          <a:bodyPr rtlCol="0" anchor="ctr"/>
+          <a:lstStyle/>
+          <a:p>
+            <a:pPr algn="ctr"/>
+            <a:r>
+              <a:rPr lang="en-US" altLang="zh-CN" dirty="0"/>
+              <a:t>APPC</a:t>
+            </a:r>
+            <a:endParaRPr lang="zh-CN" altLang="en-US" dirty="0"/>
+          </a:p>
+        </p:txBody>
+      </p:sp>
+      <p:cxnSp>
+        <p:nvCxnSpPr>
+          <p:cNvPr id="58" name="Straight Arrow Connector 57"/>
+          <p:cNvCxnSpPr>
+            <a:stCxn id="4" idx="2"/>
+            <a:endCxn id="57" idx="0"/>
+          </p:cNvCxnSpPr>
+          <p:nvPr/>
+        </p:nvCxnSpPr>
+        <p:spPr>
+          <a:xfrm>
+            <a:off x="5767388" y="3345656"/>
+            <a:ext cx="2543155" cy="1817632"/>
+          </a:xfrm>
+          <a:prstGeom prst="straightConnector1">
+            <a:avLst/>
+          </a:prstGeom>
+          <a:ln w="41275">
+            <a:tailEnd type="stealth" w="lg" len="lg"/>
+          </a:ln>
+        </p:spPr>
+        <p:style>
+          <a:lnRef idx="1">
+            <a:schemeClr val="accent1"/>
+          </a:lnRef>
+          <a:fillRef idx="0">
+            <a:schemeClr val="accent1"/>
+          </a:fillRef>
+          <a:effectRef idx="0">
+            <a:schemeClr val="accent1"/>
+          </a:effectRef>
+          <a:fontRef idx="minor">
+            <a:schemeClr val="tx1"/>
+          </a:fontRef>
+        </p:style>
+      </p:cxnSp>
+      <p:sp>
+        <p:nvSpPr>
+          <p:cNvPr id="63" name="Rectangle 62"/>
+          <p:cNvSpPr/>
+          <p:nvPr/>
+        </p:nvSpPr>
+        <p:spPr>
+          <a:xfrm>
+            <a:off x="4636067" y="5597164"/>
+            <a:ext cx="2305050" cy="600075"/>
+          </a:xfrm>
+          <a:prstGeom prst="rect">
+            <a:avLst/>
+          </a:prstGeom>
+          <a:solidFill>
+            <a:schemeClr val="bg2">
+              <a:lumMod val="75000"/>
+            </a:schemeClr>
+          </a:solidFill>
+        </p:spPr>
+        <p:style>
+          <a:lnRef idx="1">
+            <a:schemeClr val="accent1"/>
+          </a:lnRef>
+          <a:fillRef idx="2">
+            <a:schemeClr val="accent1"/>
+          </a:fillRef>
+          <a:effectRef idx="1">
+            <a:schemeClr val="accent1"/>
+          </a:effectRef>
+          <a:fontRef idx="minor">
+            <a:schemeClr val="dk1"/>
+          </a:fontRef>
+        </p:style>
+        <p:txBody>
+          <a:bodyPr rtlCol="0" anchor="ctr"/>
+          <a:lstStyle/>
+          <a:p>
+            <a:pPr algn="ctr"/>
+            <a:r>
+              <a:rPr lang="en-US" altLang="zh-CN" dirty="0"/>
+              <a:t>SDNC</a:t>
+            </a:r>
+            <a:endParaRPr lang="zh-CN" altLang="en-US" dirty="0"/>
+          </a:p>
+        </p:txBody>
+      </p:sp>
+      <p:cxnSp>
+        <p:nvCxnSpPr>
+          <p:cNvPr id="65" name="Straight Arrow Connector 64"/>
+          <p:cNvCxnSpPr>
+            <a:stCxn id="4" idx="2"/>
+            <a:endCxn id="63" idx="0"/>
+          </p:cNvCxnSpPr>
+          <p:nvPr/>
+        </p:nvCxnSpPr>
+        <p:spPr>
+          <a:xfrm>
+            <a:off x="5767388" y="3345656"/>
+            <a:ext cx="21204" cy="2251508"/>
+          </a:xfrm>
+          <a:prstGeom prst="straightConnector1">
+            <a:avLst/>
+          </a:prstGeom>
+          <a:ln w="41275">
+            <a:tailEnd type="stealth" w="lg" len="lg"/>
+          </a:ln>
+        </p:spPr>
+        <p:style>
+          <a:lnRef idx="1">
+            <a:schemeClr val="accent1"/>
+          </a:lnRef>
+          <a:fillRef idx="0">
+            <a:schemeClr val="accent1"/>
+          </a:fillRef>
+          <a:effectRef idx="0">
+            <a:schemeClr val="accent1"/>
+          </a:effectRef>
+          <a:fontRef idx="minor">
+            <a:schemeClr val="tx1"/>
+          </a:fontRef>
+        </p:style>
+      </p:cxnSp>
+      <p:cxnSp>
+        <p:nvCxnSpPr>
+          <p:cNvPr id="69" name="Straight Arrow Connector 68"/>
+          <p:cNvCxnSpPr>
+            <a:stCxn id="12" idx="3"/>
+            <a:endCxn id="4" idx="1"/>
+          </p:cNvCxnSpPr>
+          <p:nvPr/>
+        </p:nvCxnSpPr>
+        <p:spPr>
+          <a:xfrm flipV="1">
+            <a:off x="3005833" y="3045619"/>
+            <a:ext cx="1304230" cy="1142192"/>
+          </a:xfrm>
+          <a:prstGeom prst="straightConnector1">
+            <a:avLst/>
+          </a:prstGeom>
+          <a:ln w="41275">
+            <a:tailEnd type="stealth" w="lg" len="lg"/>
+          </a:ln>
+        </p:spPr>
+        <p:style>
+          <a:lnRef idx="1">
+            <a:schemeClr val="accent1"/>
+          </a:lnRef>
+          <a:fillRef idx="0">
+            <a:schemeClr val="accent1"/>
+          </a:fillRef>
+          <a:effectRef idx="0">
+            <a:schemeClr val="accent1"/>
+          </a:effectRef>
+          <a:fontRef idx="minor">
+            <a:schemeClr val="tx1"/>
+          </a:fontRef>
+        </p:style>
+      </p:cxnSp>
+      <p:sp>
+        <p:nvSpPr>
+          <p:cNvPr id="92" name="Rectangle 91"/>
+          <p:cNvSpPr/>
+          <p:nvPr/>
+        </p:nvSpPr>
+        <p:spPr>
+          <a:xfrm>
+            <a:off x="8959833" y="1517890"/>
+            <a:ext cx="2305050" cy="600075"/>
+          </a:xfrm>
+          <a:prstGeom prst="rect">
+            <a:avLst/>
+          </a:prstGeom>
+          <a:solidFill>
+            <a:schemeClr val="bg2">
+              <a:lumMod val="75000"/>
+            </a:schemeClr>
+          </a:solidFill>
+        </p:spPr>
+        <p:style>
+          <a:lnRef idx="1">
+            <a:schemeClr val="accent1"/>
+          </a:lnRef>
+          <a:fillRef idx="2">
+            <a:schemeClr val="accent1"/>
+          </a:fillRef>
+          <a:effectRef idx="1">
+            <a:schemeClr val="accent1"/>
+          </a:effectRef>
+          <a:fontRef idx="minor">
+            <a:schemeClr val="dk1"/>
+          </a:fontRef>
+        </p:style>
+        <p:txBody>
+          <a:bodyPr rtlCol="0" anchor="ctr"/>
+          <a:lstStyle/>
+          <a:p>
+            <a:pPr algn="ctr"/>
+            <a:r>
+              <a:rPr lang="en-US" altLang="zh-CN" dirty="0" smtClean="0"/>
+              <a:t>DCAE</a:t>
+            </a:r>
+            <a:endParaRPr lang="zh-CN" altLang="en-US" dirty="0"/>
+          </a:p>
+        </p:txBody>
+      </p:sp>
+      <p:cxnSp>
+        <p:nvCxnSpPr>
+          <p:cNvPr id="94" name="Straight Arrow Connector 93"/>
+          <p:cNvCxnSpPr>
+            <a:stCxn id="92" idx="1"/>
+          </p:cNvCxnSpPr>
+          <p:nvPr/>
+        </p:nvCxnSpPr>
+        <p:spPr>
+          <a:xfrm flipH="1">
+            <a:off x="6076335" y="1817928"/>
+            <a:ext cx="2883498" cy="909292"/>
+          </a:xfrm>
+          <a:prstGeom prst="straightConnector1">
+            <a:avLst/>
+          </a:prstGeom>
+          <a:ln w="41275">
+            <a:tailEnd type="stealth" w="lg" len="lg"/>
+          </a:ln>
+        </p:spPr>
+        <p:style>
+          <a:lnRef idx="1">
+            <a:schemeClr val="accent1"/>
+          </a:lnRef>
+          <a:fillRef idx="0">
+            <a:schemeClr val="accent1"/>
+          </a:fillRef>
+          <a:effectRef idx="0">
+            <a:schemeClr val="accent1"/>
+          </a:effectRef>
+          <a:fontRef idx="minor">
+            <a:schemeClr val="tx1"/>
+          </a:fontRef>
+        </p:style>
+      </p:cxnSp>
+    </p:spTree>
+    <p:extLst>
+      <p:ext uri="{BB962C8B-B14F-4D97-AF65-F5344CB8AC3E}">
+        <p14:creationId xmlns:p14="http://schemas.microsoft.com/office/powerpoint/2010/main" val="2877272754"/>
+      </p:ext>
+    </p:extLst>
+  </p:cSld>
+  <p:clrMapOvr>
+    <a:masterClrMapping/>
+  </p:clrMapOvr>
+</p:sld>
+</file>
+
 <file path=ppt/theme/theme1.xml><?xml version="1.0" encoding="utf-8"?>
 <a:theme xmlns:a="http://schemas.openxmlformats.org/drawingml/2006/main" name="Office Theme">
   <a:themeElements>

</xml_diff>

<commit_message>
update the SO architecture
Issue-ID: SO-2729

Signed-off-by: seshukm <seshu.kumar.m@huawei.com>
Change-Id: I8d99e58ce08911bbbdb31020e93ca1a76ffcc5e9
</commit_message>
<xml_diff>
--- a/docs/architecture/SO Internal Arc.pptx
+++ b/docs/architecture/SO Internal Arc.pptx
@@ -245,7 +245,7 @@
           <a:p>
             <a:fld id="{61E7D421-8CE4-4F19-BE4B-2C0A0F6FCEE0}" type="datetimeFigureOut">
               <a:rPr lang="zh-CN" altLang="en-US" smtClean="0"/>
-              <a:t>2019/4/25</a:t>
+              <a:t>2020/4/15</a:t>
             </a:fld>
             <a:endParaRPr lang="zh-CN" altLang="en-US"/>
           </a:p>
@@ -415,7 +415,7 @@
           <a:p>
             <a:fld id="{61E7D421-8CE4-4F19-BE4B-2C0A0F6FCEE0}" type="datetimeFigureOut">
               <a:rPr lang="zh-CN" altLang="en-US" smtClean="0"/>
-              <a:t>2019/4/25</a:t>
+              <a:t>2020/4/15</a:t>
             </a:fld>
             <a:endParaRPr lang="zh-CN" altLang="en-US"/>
           </a:p>
@@ -595,7 +595,7 @@
           <a:p>
             <a:fld id="{61E7D421-8CE4-4F19-BE4B-2C0A0F6FCEE0}" type="datetimeFigureOut">
               <a:rPr lang="zh-CN" altLang="en-US" smtClean="0"/>
-              <a:t>2019/4/25</a:t>
+              <a:t>2020/4/15</a:t>
             </a:fld>
             <a:endParaRPr lang="zh-CN" altLang="en-US"/>
           </a:p>
@@ -765,7 +765,7 @@
           <a:p>
             <a:fld id="{61E7D421-8CE4-4F19-BE4B-2C0A0F6FCEE0}" type="datetimeFigureOut">
               <a:rPr lang="zh-CN" altLang="en-US" smtClean="0"/>
-              <a:t>2019/4/25</a:t>
+              <a:t>2020/4/15</a:t>
             </a:fld>
             <a:endParaRPr lang="zh-CN" altLang="en-US"/>
           </a:p>
@@ -1011,7 +1011,7 @@
           <a:p>
             <a:fld id="{61E7D421-8CE4-4F19-BE4B-2C0A0F6FCEE0}" type="datetimeFigureOut">
               <a:rPr lang="zh-CN" altLang="en-US" smtClean="0"/>
-              <a:t>2019/4/25</a:t>
+              <a:t>2020/4/15</a:t>
             </a:fld>
             <a:endParaRPr lang="zh-CN" altLang="en-US"/>
           </a:p>
@@ -1243,7 +1243,7 @@
           <a:p>
             <a:fld id="{61E7D421-8CE4-4F19-BE4B-2C0A0F6FCEE0}" type="datetimeFigureOut">
               <a:rPr lang="zh-CN" altLang="en-US" smtClean="0"/>
-              <a:t>2019/4/25</a:t>
+              <a:t>2020/4/15</a:t>
             </a:fld>
             <a:endParaRPr lang="zh-CN" altLang="en-US"/>
           </a:p>
@@ -1610,7 +1610,7 @@
           <a:p>
             <a:fld id="{61E7D421-8CE4-4F19-BE4B-2C0A0F6FCEE0}" type="datetimeFigureOut">
               <a:rPr lang="zh-CN" altLang="en-US" smtClean="0"/>
-              <a:t>2019/4/25</a:t>
+              <a:t>2020/4/15</a:t>
             </a:fld>
             <a:endParaRPr lang="zh-CN" altLang="en-US"/>
           </a:p>
@@ -1728,7 +1728,7 @@
           <a:p>
             <a:fld id="{61E7D421-8CE4-4F19-BE4B-2C0A0F6FCEE0}" type="datetimeFigureOut">
               <a:rPr lang="zh-CN" altLang="en-US" smtClean="0"/>
-              <a:t>2019/4/25</a:t>
+              <a:t>2020/4/15</a:t>
             </a:fld>
             <a:endParaRPr lang="zh-CN" altLang="en-US"/>
           </a:p>
@@ -1823,7 +1823,7 @@
           <a:p>
             <a:fld id="{61E7D421-8CE4-4F19-BE4B-2C0A0F6FCEE0}" type="datetimeFigureOut">
               <a:rPr lang="zh-CN" altLang="en-US" smtClean="0"/>
-              <a:t>2019/4/25</a:t>
+              <a:t>2020/4/15</a:t>
             </a:fld>
             <a:endParaRPr lang="zh-CN" altLang="en-US"/>
           </a:p>
@@ -2100,7 +2100,7 @@
           <a:p>
             <a:fld id="{61E7D421-8CE4-4F19-BE4B-2C0A0F6FCEE0}" type="datetimeFigureOut">
               <a:rPr lang="zh-CN" altLang="en-US" smtClean="0"/>
-              <a:t>2019/4/25</a:t>
+              <a:t>2020/4/15</a:t>
             </a:fld>
             <a:endParaRPr lang="zh-CN" altLang="en-US"/>
           </a:p>
@@ -2353,7 +2353,7 @@
           <a:p>
             <a:fld id="{61E7D421-8CE4-4F19-BE4B-2C0A0F6FCEE0}" type="datetimeFigureOut">
               <a:rPr lang="zh-CN" altLang="en-US" smtClean="0"/>
-              <a:t>2019/4/25</a:t>
+              <a:t>2020/4/15</a:t>
             </a:fld>
             <a:endParaRPr lang="zh-CN" altLang="en-US"/>
           </a:p>
@@ -2566,7 +2566,7 @@
           <a:p>
             <a:fld id="{61E7D421-8CE4-4F19-BE4B-2C0A0F6FCEE0}" type="datetimeFigureOut">
               <a:rPr lang="zh-CN" altLang="en-US" smtClean="0"/>
-              <a:t>2019/4/25</a:t>
+              <a:t>2020/4/15</a:t>
             </a:fld>
             <a:endParaRPr lang="zh-CN" altLang="en-US"/>
           </a:p>
@@ -4972,8 +4972,8 @@
           </p:nvSpPr>
           <p:spPr>
             <a:xfrm>
-              <a:off x="8450252" y="4311804"/>
-              <a:ext cx="1014866" cy="409656"/>
+              <a:off x="8391133" y="4312804"/>
+              <a:ext cx="714476" cy="409656"/>
             </a:xfrm>
             <a:prstGeom prst="rect">
               <a:avLst/>
@@ -5018,7 +5018,23 @@
                     <a:prstClr val="black"/>
                   </a:solidFill>
                 </a:rPr>
-                <a:t>Controller Adapter</a:t>
+                <a:t>Controller </a:t>
+              </a:r>
+              <a:endParaRPr lang="en-US" sz="1000" kern="0" dirty="0" smtClean="0">
+                <a:solidFill>
+                  <a:prstClr val="black"/>
+                </a:solidFill>
+              </a:endParaRPr>
+            </a:p>
+            <a:p>
+              <a:pPr algn="ctr" defTabSz="914134"/>
+              <a:r>
+                <a:rPr lang="en-US" sz="1000" kern="0" dirty="0" smtClean="0">
+                  <a:solidFill>
+                    <a:prstClr val="black"/>
+                  </a:solidFill>
+                </a:rPr>
+                <a:t>Adapter</a:t>
               </a:r>
               <a:endParaRPr lang="en-US" sz="1000" kern="0" dirty="0">
                 <a:solidFill>
@@ -6175,7 +6191,7 @@
           </p:nvCxnSpPr>
           <p:spPr>
             <a:xfrm flipH="1">
-              <a:off x="9151219" y="4754197"/>
+              <a:off x="8953753" y="4769565"/>
               <a:ext cx="13509" cy="474469"/>
             </a:xfrm>
             <a:prstGeom prst="straightConnector1">
@@ -6324,8 +6340,8 @@
         </p:nvSpPr>
         <p:spPr>
           <a:xfrm>
-            <a:off x="6571166" y="4181842"/>
-            <a:ext cx="1276415" cy="394247"/>
+            <a:off x="6046079" y="4179619"/>
+            <a:ext cx="835845" cy="394247"/>
           </a:xfrm>
           <a:prstGeom prst="rect">
             <a:avLst/>
@@ -6457,44 +6473,86 @@
           </a:p>
         </p:txBody>
       </p:sp>
-      <p:cxnSp>
-        <p:nvCxnSpPr>
-          <p:cNvPr id="76" name="Straight Arrow Connector 75"/>
-          <p:cNvCxnSpPr>
-            <a:stCxn id="73" idx="3"/>
-          </p:cNvCxnSpPr>
+      <p:sp>
+        <p:nvSpPr>
+          <p:cNvPr id="71" name="Rectangle 70"/>
+          <p:cNvSpPr/>
           <p:nvPr/>
-        </p:nvCxnSpPr>
+        </p:nvSpPr>
         <p:spPr>
           <a:xfrm>
-            <a:off x="7847581" y="4378966"/>
-            <a:ext cx="1271756" cy="677167"/>
+            <a:off x="7026853" y="4177396"/>
+            <a:ext cx="835845" cy="394247"/>
           </a:xfrm>
-          <a:prstGeom prst="straightConnector1">
+          <a:prstGeom prst="rect">
             <a:avLst/>
           </a:prstGeom>
-          <a:ln w="19050">
-            <a:solidFill>
-              <a:schemeClr val="tx1"/>
-            </a:solidFill>
-            <a:tailEnd type="arrow"/>
+          <a:solidFill>
+            <a:schemeClr val="accent4">
+              <a:lumMod val="40000"/>
+              <a:lumOff val="60000"/>
+            </a:schemeClr>
+          </a:solidFill>
+          <a:ln w="25400" cap="flat" cmpd="sng" algn="ctr">
+            <a:noFill/>
+            <a:prstDash val="solid"/>
           </a:ln>
+          <a:effectLst>
+            <a:outerShdw blurRad="44450" dist="27940" dir="5400000" algn="ctr">
+              <a:srgbClr val="000000">
+                <a:alpha val="32000"/>
+              </a:srgbClr>
+            </a:outerShdw>
+          </a:effectLst>
+          <a:scene3d>
+            <a:camera prst="orthographicFront">
+              <a:rot lat="0" lon="0" rev="0"/>
+            </a:camera>
+            <a:lightRig rig="balanced" dir="t">
+              <a:rot lat="0" lon="0" rev="8700000"/>
+            </a:lightRig>
+          </a:scene3d>
+          <a:sp3d>
+            <a:bevelT w="190500" h="38100"/>
+          </a:sp3d>
         </p:spPr>
-        <p:style>
-          <a:lnRef idx="1">
-            <a:schemeClr val="accent1"/>
-          </a:lnRef>
-          <a:fillRef idx="0">
-            <a:schemeClr val="accent1"/>
-          </a:fillRef>
-          <a:effectRef idx="0">
-            <a:schemeClr val="accent1"/>
-          </a:effectRef>
-          <a:fontRef idx="minor">
-            <a:schemeClr val="tx1"/>
-          </a:fontRef>
-        </p:style>
-      </p:cxnSp>
+        <p:txBody>
+          <a:bodyPr lIns="91413" tIns="45707" rIns="91413" bIns="45707" rtlCol="0" anchor="ctr"/>
+          <a:lstStyle/>
+          <a:p>
+            <a:pPr algn="ctr" defTabSz="914134"/>
+            <a:r>
+              <a:rPr lang="en-US" sz="1000" kern="0" dirty="0" err="1" smtClean="0">
+                <a:solidFill>
+                  <a:prstClr val="black"/>
+                </a:solidFill>
+              </a:rPr>
+              <a:t>Ve</a:t>
+            </a:r>
+            <a:r>
+              <a:rPr lang="en-US" sz="1000" kern="0" dirty="0" smtClean="0">
+                <a:solidFill>
+                  <a:prstClr val="black"/>
+                </a:solidFill>
+              </a:rPr>
+              <a:t>-VNFM </a:t>
+            </a:r>
+            <a:r>
+              <a:rPr lang="en-US" sz="1000" kern="0" dirty="0" smtClean="0">
+                <a:solidFill>
+                  <a:prstClr val="black"/>
+                </a:solidFill>
+              </a:rPr>
+              <a:t>Adapter</a:t>
+            </a:r>
+            <a:endParaRPr lang="en-US" sz="1000" kern="0" dirty="0">
+              <a:solidFill>
+                <a:prstClr val="black"/>
+              </a:solidFill>
+            </a:endParaRPr>
+          </a:p>
+        </p:txBody>
+      </p:sp>
     </p:spTree>
     <p:extLst>
       <p:ext uri="{BB962C8B-B14F-4D97-AF65-F5344CB8AC3E}">

</xml_diff>

<commit_message>
update the deployment view of the SO
Issue-ID: SO-3909

Signed-off-by: Seshu-Kumar-M <seshu.kumar.m@huawei.com>
Change-Id: Id45a1eac5356d7451f681a81fd6abd05efd04491
</commit_message>
<xml_diff>
--- a/docs/architecture/SO Internal Arc.pptx
+++ b/docs/architecture/SO Internal Arc.pptx
@@ -6,8 +6,10 @@
   </p:sldMasterIdLst>
   <p:sldIdLst>
     <p:sldId id="257" r:id="rId2"/>
-    <p:sldId id="258" r:id="rId3"/>
-    <p:sldId id="259" r:id="rId4"/>
+    <p:sldId id="260" r:id="rId3"/>
+    <p:sldId id="261" r:id="rId4"/>
+    <p:sldId id="258" r:id="rId5"/>
+    <p:sldId id="259" r:id="rId6"/>
   </p:sldIdLst>
   <p:sldSz cx="12192000" cy="6858000"/>
   <p:notesSz cx="6858000" cy="9144000"/>
@@ -245,7 +247,7 @@
           <a:p>
             <a:fld id="{61E7D421-8CE4-4F19-BE4B-2C0A0F6FCEE0}" type="datetimeFigureOut">
               <a:rPr lang="zh-CN" altLang="en-US" smtClean="0"/>
-              <a:t>2020/4/15</a:t>
+              <a:t>2022/3/22</a:t>
             </a:fld>
             <a:endParaRPr lang="zh-CN" altLang="en-US"/>
           </a:p>
@@ -415,7 +417,7 @@
           <a:p>
             <a:fld id="{61E7D421-8CE4-4F19-BE4B-2C0A0F6FCEE0}" type="datetimeFigureOut">
               <a:rPr lang="zh-CN" altLang="en-US" smtClean="0"/>
-              <a:t>2020/4/15</a:t>
+              <a:t>2022/3/22</a:t>
             </a:fld>
             <a:endParaRPr lang="zh-CN" altLang="en-US"/>
           </a:p>
@@ -595,7 +597,7 @@
           <a:p>
             <a:fld id="{61E7D421-8CE4-4F19-BE4B-2C0A0F6FCEE0}" type="datetimeFigureOut">
               <a:rPr lang="zh-CN" altLang="en-US" smtClean="0"/>
-              <a:t>2020/4/15</a:t>
+              <a:t>2022/3/22</a:t>
             </a:fld>
             <a:endParaRPr lang="zh-CN" altLang="en-US"/>
           </a:p>
@@ -765,7 +767,7 @@
           <a:p>
             <a:fld id="{61E7D421-8CE4-4F19-BE4B-2C0A0F6FCEE0}" type="datetimeFigureOut">
               <a:rPr lang="zh-CN" altLang="en-US" smtClean="0"/>
-              <a:t>2020/4/15</a:t>
+              <a:t>2022/3/22</a:t>
             </a:fld>
             <a:endParaRPr lang="zh-CN" altLang="en-US"/>
           </a:p>
@@ -1011,7 +1013,7 @@
           <a:p>
             <a:fld id="{61E7D421-8CE4-4F19-BE4B-2C0A0F6FCEE0}" type="datetimeFigureOut">
               <a:rPr lang="zh-CN" altLang="en-US" smtClean="0"/>
-              <a:t>2020/4/15</a:t>
+              <a:t>2022/3/22</a:t>
             </a:fld>
             <a:endParaRPr lang="zh-CN" altLang="en-US"/>
           </a:p>
@@ -1243,7 +1245,7 @@
           <a:p>
             <a:fld id="{61E7D421-8CE4-4F19-BE4B-2C0A0F6FCEE0}" type="datetimeFigureOut">
               <a:rPr lang="zh-CN" altLang="en-US" smtClean="0"/>
-              <a:t>2020/4/15</a:t>
+              <a:t>2022/3/22</a:t>
             </a:fld>
             <a:endParaRPr lang="zh-CN" altLang="en-US"/>
           </a:p>
@@ -1610,7 +1612,7 @@
           <a:p>
             <a:fld id="{61E7D421-8CE4-4F19-BE4B-2C0A0F6FCEE0}" type="datetimeFigureOut">
               <a:rPr lang="zh-CN" altLang="en-US" smtClean="0"/>
-              <a:t>2020/4/15</a:t>
+              <a:t>2022/3/22</a:t>
             </a:fld>
             <a:endParaRPr lang="zh-CN" altLang="en-US"/>
           </a:p>
@@ -1728,7 +1730,7 @@
           <a:p>
             <a:fld id="{61E7D421-8CE4-4F19-BE4B-2C0A0F6FCEE0}" type="datetimeFigureOut">
               <a:rPr lang="zh-CN" altLang="en-US" smtClean="0"/>
-              <a:t>2020/4/15</a:t>
+              <a:t>2022/3/22</a:t>
             </a:fld>
             <a:endParaRPr lang="zh-CN" altLang="en-US"/>
           </a:p>
@@ -1823,7 +1825,7 @@
           <a:p>
             <a:fld id="{61E7D421-8CE4-4F19-BE4B-2C0A0F6FCEE0}" type="datetimeFigureOut">
               <a:rPr lang="zh-CN" altLang="en-US" smtClean="0"/>
-              <a:t>2020/4/15</a:t>
+              <a:t>2022/3/22</a:t>
             </a:fld>
             <a:endParaRPr lang="zh-CN" altLang="en-US"/>
           </a:p>
@@ -2100,7 +2102,7 @@
           <a:p>
             <a:fld id="{61E7D421-8CE4-4F19-BE4B-2C0A0F6FCEE0}" type="datetimeFigureOut">
               <a:rPr lang="zh-CN" altLang="en-US" smtClean="0"/>
-              <a:t>2020/4/15</a:t>
+              <a:t>2022/3/22</a:t>
             </a:fld>
             <a:endParaRPr lang="zh-CN" altLang="en-US"/>
           </a:p>
@@ -2353,7 +2355,7 @@
           <a:p>
             <a:fld id="{61E7D421-8CE4-4F19-BE4B-2C0A0F6FCEE0}" type="datetimeFigureOut">
               <a:rPr lang="zh-CN" altLang="en-US" smtClean="0"/>
-              <a:t>2020/4/15</a:t>
+              <a:t>2022/3/22</a:t>
             </a:fld>
             <a:endParaRPr lang="zh-CN" altLang="en-US"/>
           </a:p>
@@ -2566,7 +2568,7 @@
           <a:p>
             <a:fld id="{61E7D421-8CE4-4F19-BE4B-2C0A0F6FCEE0}" type="datetimeFigureOut">
               <a:rPr lang="zh-CN" altLang="en-US" smtClean="0"/>
-              <a:t>2020/4/15</a:t>
+              <a:t>2022/3/22</a:t>
             </a:fld>
             <a:endParaRPr lang="zh-CN" altLang="en-US"/>
           </a:p>
@@ -3259,6 +3261,16 @@
             <a:p>
               <a:pPr algn="ctr" defTabSz="914134"/>
               <a:r>
+                <a:rPr lang="en-US" sz="800" b="1" kern="0" dirty="0" smtClean="0">
+                  <a:solidFill>
+                    <a:prstClr val="black"/>
+                  </a:solidFill>
+                  <a:latin typeface="Calibri" panose="020F0502020204030204" pitchFamily="34" charset="0"/>
+                  <a:cs typeface="Calibri" panose="020F0502020204030204" pitchFamily="34" charset="0"/>
+                </a:rPr>
+                <a:t>BPMN Execution </a:t>
+              </a:r>
+              <a:r>
                 <a:rPr lang="en-US" sz="800" b="1" kern="0" dirty="0">
                   <a:solidFill>
                     <a:prstClr val="black"/>
@@ -3266,7 +3278,7 @@
                   <a:latin typeface="Calibri" panose="020F0502020204030204" pitchFamily="34" charset="0"/>
                   <a:cs typeface="Calibri" panose="020F0502020204030204" pitchFamily="34" charset="0"/>
                 </a:rPr>
-                <a:t>BPEL Execution Engine</a:t>
+                <a:t>Engine</a:t>
               </a:r>
             </a:p>
           </p:txBody>
@@ -5020,11 +5032,6 @@
                 </a:rPr>
                 <a:t>Controller </a:t>
               </a:r>
-              <a:endParaRPr lang="en-US" sz="1000" kern="0" dirty="0" smtClean="0">
-                <a:solidFill>
-                  <a:prstClr val="black"/>
-                </a:solidFill>
-              </a:endParaRPr>
             </a:p>
             <a:p>
               <a:pPr algn="ctr" defTabSz="914134"/>
@@ -5122,8 +5129,21 @@
                     <a:prstClr val="black"/>
                   </a:solidFill>
                 </a:rPr>
-                <a:t>(Open stack)</a:t>
+                <a:t>(Open </a:t>
               </a:r>
+              <a:r>
+                <a:rPr lang="en-US" sz="1100" kern="0" dirty="0" smtClean="0">
+                  <a:solidFill>
+                    <a:prstClr val="black"/>
+                  </a:solidFill>
+                </a:rPr>
+                <a:t>stack)</a:t>
+              </a:r>
+              <a:endParaRPr lang="en-US" sz="1100" kern="0" dirty="0">
+                <a:solidFill>
+                  <a:prstClr val="black"/>
+                </a:solidFill>
+              </a:endParaRPr>
             </a:p>
           </p:txBody>
         </p:sp>
@@ -6535,15 +6555,7 @@
                   <a:prstClr val="black"/>
                 </a:solidFill>
               </a:rPr>
-              <a:t>-VNFM </a:t>
-            </a:r>
-            <a:r>
-              <a:rPr lang="en-US" sz="1000" kern="0" dirty="0" smtClean="0">
-                <a:solidFill>
-                  <a:prstClr val="black"/>
-                </a:solidFill>
-              </a:rPr>
-              <a:t>Adapter</a:t>
+              <a:t>-VNFM Adapter</a:t>
             </a:r>
             <a:endParaRPr lang="en-US" sz="1000" kern="0" dirty="0">
               <a:solidFill>
@@ -6567,6 +6579,159 @@
 </file>
 
 <file path=ppt/slides/slide2.xml><?xml version="1.0" encoding="utf-8"?>
+<p:sld xmlns:a="http://schemas.openxmlformats.org/drawingml/2006/main" xmlns:r="http://schemas.openxmlformats.org/officeDocument/2006/relationships" xmlns:p="http://schemas.openxmlformats.org/presentationml/2006/main">
+  <p:cSld>
+    <p:spTree>
+      <p:nvGrpSpPr>
+        <p:cNvPr id="1" name=""/>
+        <p:cNvGrpSpPr/>
+        <p:nvPr/>
+      </p:nvGrpSpPr>
+      <p:grpSpPr>
+        <a:xfrm>
+          <a:off x="0" y="0"/>
+          <a:ext cx="0" cy="0"/>
+          <a:chOff x="0" y="0"/>
+          <a:chExt cx="0" cy="0"/>
+        </a:xfrm>
+      </p:grpSpPr>
+      <p:sp>
+        <p:nvSpPr>
+          <p:cNvPr id="2" name="Title 1"/>
+          <p:cNvSpPr>
+            <a:spLocks noGrp="1"/>
+          </p:cNvSpPr>
+          <p:nvPr>
+            <p:ph type="title"/>
+          </p:nvPr>
+        </p:nvSpPr>
+        <p:spPr>
+          <a:xfrm>
+            <a:off x="838200" y="365125"/>
+            <a:ext cx="10515600" cy="585851"/>
+          </a:xfrm>
+        </p:spPr>
+        <p:txBody>
+          <a:bodyPr>
+            <a:normAutofit fontScale="90000"/>
+          </a:bodyPr>
+          <a:lstStyle/>
+          <a:p>
+            <a:endParaRPr lang="en-US" dirty="0"/>
+          </a:p>
+        </p:txBody>
+      </p:sp>
+      <p:pic>
+        <p:nvPicPr>
+          <p:cNvPr id="4" name="Picture 3"/>
+          <p:cNvPicPr>
+            <a:picLocks noChangeAspect="1"/>
+          </p:cNvPicPr>
+          <p:nvPr/>
+        </p:nvPicPr>
+        <p:blipFill>
+          <a:blip r:embed="rId2"/>
+          <a:stretch>
+            <a:fillRect/>
+          </a:stretch>
+        </p:blipFill>
+        <p:spPr>
+          <a:xfrm>
+            <a:off x="0" y="365125"/>
+            <a:ext cx="12192000" cy="6492875"/>
+          </a:xfrm>
+          <a:prstGeom prst="rect">
+            <a:avLst/>
+          </a:prstGeom>
+        </p:spPr>
+      </p:pic>
+    </p:spTree>
+    <p:extLst>
+      <p:ext uri="{BB962C8B-B14F-4D97-AF65-F5344CB8AC3E}">
+        <p14:creationId xmlns:p14="http://schemas.microsoft.com/office/powerpoint/2010/main" val="567128397"/>
+      </p:ext>
+    </p:extLst>
+  </p:cSld>
+  <p:clrMapOvr>
+    <a:masterClrMapping/>
+  </p:clrMapOvr>
+</p:sld>
+</file>
+
+<file path=ppt/slides/slide3.xml><?xml version="1.0" encoding="utf-8"?>
+<p:sld xmlns:a="http://schemas.openxmlformats.org/drawingml/2006/main" xmlns:r="http://schemas.openxmlformats.org/officeDocument/2006/relationships" xmlns:p="http://schemas.openxmlformats.org/presentationml/2006/main">
+  <p:cSld>
+    <p:spTree>
+      <p:nvGrpSpPr>
+        <p:cNvPr id="1" name=""/>
+        <p:cNvGrpSpPr/>
+        <p:nvPr/>
+      </p:nvGrpSpPr>
+      <p:grpSpPr>
+        <a:xfrm>
+          <a:off x="0" y="0"/>
+          <a:ext cx="0" cy="0"/>
+          <a:chOff x="0" y="0"/>
+          <a:chExt cx="0" cy="0"/>
+        </a:xfrm>
+      </p:grpSpPr>
+      <p:sp>
+        <p:nvSpPr>
+          <p:cNvPr id="2" name="Title 1"/>
+          <p:cNvSpPr>
+            <a:spLocks noGrp="1"/>
+          </p:cNvSpPr>
+          <p:nvPr>
+            <p:ph type="title"/>
+          </p:nvPr>
+        </p:nvSpPr>
+        <p:spPr/>
+        <p:txBody>
+          <a:bodyPr/>
+          <a:lstStyle/>
+          <a:p>
+            <a:endParaRPr lang="en-US"/>
+          </a:p>
+        </p:txBody>
+      </p:sp>
+      <p:pic>
+        <p:nvPicPr>
+          <p:cNvPr id="4" name="Picture 3"/>
+          <p:cNvPicPr>
+            <a:picLocks noChangeAspect="1"/>
+          </p:cNvPicPr>
+          <p:nvPr/>
+        </p:nvPicPr>
+        <p:blipFill>
+          <a:blip r:embed="rId2"/>
+          <a:stretch>
+            <a:fillRect/>
+          </a:stretch>
+        </p:blipFill>
+        <p:spPr>
+          <a:xfrm>
+            <a:off x="0" y="651893"/>
+            <a:ext cx="12192000" cy="5554213"/>
+          </a:xfrm>
+          <a:prstGeom prst="rect">
+            <a:avLst/>
+          </a:prstGeom>
+        </p:spPr>
+      </p:pic>
+    </p:spTree>
+    <p:extLst>
+      <p:ext uri="{BB962C8B-B14F-4D97-AF65-F5344CB8AC3E}">
+        <p14:creationId xmlns:p14="http://schemas.microsoft.com/office/powerpoint/2010/main" val="3923521743"/>
+      </p:ext>
+    </p:extLst>
+  </p:cSld>
+  <p:clrMapOvr>
+    <a:masterClrMapping/>
+  </p:clrMapOvr>
+</p:sld>
+</file>
+
+<file path=ppt/slides/slide4.xml><?xml version="1.0" encoding="utf-8"?>
 <p:sld xmlns:a="http://schemas.openxmlformats.org/drawingml/2006/main" xmlns:r="http://schemas.openxmlformats.org/officeDocument/2006/relationships" xmlns:p="http://schemas.openxmlformats.org/presentationml/2006/main">
   <p:cSld>
     <p:spTree>
@@ -7914,7 +8079,7 @@
 </p:sld>
 </file>
 
-<file path=ppt/slides/slide3.xml><?xml version="1.0" encoding="utf-8"?>
+<file path=ppt/slides/slide5.xml><?xml version="1.0" encoding="utf-8"?>
 <p:sld xmlns:a="http://schemas.openxmlformats.org/drawingml/2006/main" xmlns:r="http://schemas.openxmlformats.org/officeDocument/2006/relationships" xmlns:p="http://schemas.openxmlformats.org/presentationml/2006/main">
   <p:cSld>
     <p:spTree>

</xml_diff>